<commit_message>
Change approach to nested vs non-nested cv
</commit_message>
<xml_diff>
--- a/docs/poster.pptx
+++ b/docs/poster.pptx
@@ -225,7 +225,7 @@
             <a:fld id="{0158C5BC-9A70-462C-B28D-9600239EAC64}" type="datetimeFigureOut">
               <a:rPr lang="en-US" smtClean="0"/>
               <a:pPr/>
-              <a:t>2/6/23</a:t>
+              <a:t>2/18/23</a:t>
             </a:fld>
             <a:endParaRPr lang="en-US"/>
           </a:p>
@@ -392,7 +392,7 @@
             <a:fld id="{E6CC2317-6751-4CD4-9995-8782DD78E936}" type="datetimeFigureOut">
               <a:rPr lang="en-US" smtClean="0"/>
               <a:pPr/>
-              <a:t>2/6/23</a:t>
+              <a:t>2/18/23</a:t>
             </a:fld>
             <a:endParaRPr lang="en-US" dirty="0"/>
           </a:p>
@@ -7652,7 +7652,7 @@
         <p:spPr>
           <a:xfrm>
             <a:off x="274918" y="3338381"/>
-            <a:ext cx="6959003" cy="7017306"/>
+            <a:ext cx="6959003" cy="5170646"/>
           </a:xfrm>
         </p:spPr>
         <p:txBody>
@@ -7661,7 +7661,15 @@
           <a:p>
             <a:r>
               <a:rPr lang="en-US" dirty="0"/>
-              <a:t>Accurately pricing policies is key for insurance companies. Under-pricing policies results in losses for the company, while over-pricing policies may result in customers turning to competitors for a better quote or even sanctions from regulatory authorities. Tree-based models have shown great predictive performance in this setting; however, they tend to be unstable in the sense that optimal hyperparameters,  the effect of different features on the response, and often predictive performance are very sensitive to changes in the training data.</a:t>
+              <a:t>Accurately pricing policies is key for insurance companies. Under-pricing policies results in losses for the company, while over-pricing policies may result in customers turning to competitors for a better quote or even sanctions from regulatory authorities. </a:t>
+            </a:r>
+            <a:r>
+              <a:rPr lang="en-US" b="1" dirty="0"/>
+              <a:t>Gradient Boosting Machines (GBMs) </a:t>
+            </a:r>
+            <a:r>
+              <a:rPr lang="en-US" dirty="0"/>
+              <a:t>have shown great predictive performance in this setting; however, they tend to be unstable since they have a lot of hyperparameters and are prone to overfitting without adequate tuning.</a:t>
             </a:r>
           </a:p>
           <a:p>
@@ -7674,12 +7682,9 @@
             </a:r>
             <a:r>
               <a:rPr lang="en-US" dirty="0"/>
-              <a:t>The goal is to fit a severity model to predict the costs associated with each insurance policy in the next period. Two different models are fitted. Model 1 uses all the 100 available predictors and has a root mean squared error (RMSE) of 0.536 in the validation set. Model 2 uses 70 of the predictors and has a RMSE of 0.527. Is model 1 significantly better than model 2, or </a:t>
+              <a:t>New regulation states that insurance companies cannot use a certain client characteristic in pricing models. How does the removal of this predictor affect model performance?</a:t>
             </a:r>
-            <a:r>
-              <a:rPr lang="en-US" b="1" dirty="0"/>
-              <a:t>is it possible that under different train-validation splits the more parsimonious model exhibits better predictive performance?</a:t>
-            </a:r>
+            <a:endParaRPr lang="en-US" b="1" dirty="0"/>
           </a:p>
         </p:txBody>
       </p:sp>
@@ -7701,7 +7706,7 @@
         </p:nvSpPr>
         <p:spPr>
           <a:xfrm>
-            <a:off x="272740" y="10715425"/>
+            <a:off x="272740" y="12598658"/>
             <a:ext cx="6985298" cy="387798"/>
           </a:xfrm>
           <a:solidFill>
@@ -7746,8 +7751,8 @@
         </p:nvSpPr>
         <p:spPr>
           <a:xfrm>
-            <a:off x="262306" y="11115536"/>
-            <a:ext cx="6995731" cy="3634328"/>
+            <a:off x="262306" y="12998769"/>
+            <a:ext cx="6995731" cy="3077766"/>
           </a:xfrm>
           <a:ln w="19050">
             <a:solidFill>
@@ -7761,7 +7766,7 @@
           <a:p>
             <a:r>
               <a:rPr lang="en-US" dirty="0"/>
-              <a:t>Design a modeling pipeline that:</a:t>
+              <a:t>Transform the model training pipeline so that it:</a:t>
             </a:r>
           </a:p>
           <a:p>
@@ -7807,25 +7812,11 @@
             </a:pPr>
             <a:r>
               <a:rPr lang="en-US" dirty="0"/>
-              <a:t>Can be easily adapted to different amounts of </a:t>
+              <a:t>Effectively adapts to different </a:t>
             </a:r>
             <a:r>
               <a:rPr lang="en-US" b="1" dirty="0"/>
-              <a:t>computational resources</a:t>
-            </a:r>
-            <a:r>
-              <a:rPr lang="en-US" dirty="0"/>
-              <a:t>.</a:t>
-            </a:r>
-          </a:p>
-          <a:p>
-            <a:pPr marL="457200" indent="-457200">
-              <a:buFont typeface="+mj-lt"/>
-              <a:buAutoNum type="arabicPeriod"/>
-            </a:pPr>
-            <a:r>
-              <a:rPr lang="en-US" dirty="0"/>
-              <a:t>Can be used to study various model characteristics (e.g., feature importance).</a:t>
+              <a:t>computational and time resources.</a:t>
             </a:r>
           </a:p>
         </p:txBody>
@@ -7864,8 +7855,8 @@
           </a:p>
         </p:txBody>
       </p:sp>
-      <mc:AlternateContent xmlns:mc="http://schemas.openxmlformats.org/markup-compatibility/2006">
-        <mc:Choice xmlns:a14="http://schemas.microsoft.com/office/drawing/2010/main" Requires="a14">
+      <mc:AlternateContent xmlns:mc="http://schemas.openxmlformats.org/markup-compatibility/2006" xmlns:a14="http://schemas.microsoft.com/office/drawing/2010/main">
+        <mc:Choice Requires="a14">
           <p:sp>
             <p:nvSpPr>
               <p:cNvPr id="10" name="Text Placeholder 9">
@@ -8473,7 +8464,7 @@
             </p:txBody>
           </p:sp>
         </mc:Choice>
-        <mc:Fallback>
+        <mc:Fallback xmlns="">
           <p:sp>
             <p:nvSpPr>
               <p:cNvPr id="10" name="Text Placeholder 9">
@@ -8927,60 +8918,195 @@
           </a:p>
         </p:txBody>
       </p:sp>
-      <p:sp>
-        <p:nvSpPr>
-          <p:cNvPr id="20" name="Smiley Face 19">
+      <p:pic>
+        <p:nvPicPr>
+          <p:cNvPr id="24" name="Picture 23" descr="Icon&#10;&#10;Description automatically generated">
             <a:extLst>
               <a:ext uri="{FF2B5EF4-FFF2-40B4-BE49-F238E27FC236}">
-                <a16:creationId xmlns:a16="http://schemas.microsoft.com/office/drawing/2014/main" id="{26651A2D-B307-7009-3EEB-D418E66EC478}"/>
+                <a16:creationId xmlns:a16="http://schemas.microsoft.com/office/drawing/2014/main" id="{AAF8F5C0-6D52-D6CE-A2BD-552379EC27A1}"/>
               </a:ext>
             </a:extLst>
           </p:cNvPr>
-          <p:cNvSpPr/>
+          <p:cNvPicPr>
+            <a:picLocks noChangeAspect="1"/>
+          </p:cNvPicPr>
           <p:nvPr/>
-        </p:nvSpPr>
+        </p:nvPicPr>
+        <p:blipFill>
+          <a:blip r:embed="rId5">
+            <a:extLst>
+              <a:ext uri="{28A0092B-C50C-407E-A947-70E740481C1C}">
+                <a14:useLocalDpi xmlns:a14="http://schemas.microsoft.com/office/drawing/2010/main" val="0"/>
+              </a:ext>
+            </a:extLst>
+          </a:blip>
+          <a:stretch>
+            <a:fillRect/>
+          </a:stretch>
+        </p:blipFill>
         <p:spPr>
           <a:xfrm>
-            <a:off x="16488697" y="8701548"/>
-            <a:ext cx="3805084" cy="3510117"/>
+            <a:off x="14793171" y="10693250"/>
+            <a:ext cx="1652116" cy="1645688"/>
           </a:xfrm>
-          <a:prstGeom prst="smileyFace">
+          <a:prstGeom prst="rect">
             <a:avLst/>
           </a:prstGeom>
         </p:spPr>
-        <p:style>
-          <a:lnRef idx="3">
-            <a:schemeClr val="lt1"/>
-          </a:lnRef>
-          <a:fillRef idx="1">
-            <a:schemeClr val="accent1"/>
-          </a:fillRef>
-          <a:effectRef idx="1">
-            <a:schemeClr val="accent1"/>
-          </a:effectRef>
-          <a:fontRef idx="minor">
-            <a:schemeClr val="lt1"/>
-          </a:fontRef>
-        </p:style>
-        <p:txBody>
-          <a:bodyPr rtlCol="0" anchor="ctr"/>
-          <a:lstStyle/>
-          <a:p>
-            <a:pPr algn="ctr"/>
-            <a:endParaRPr lang="en-US">
-              <a:solidFill>
-                <a:schemeClr val="bg1"/>
-              </a:solidFill>
-            </a:endParaRPr>
-          </a:p>
-        </p:txBody>
-      </p:sp>
+      </p:pic>
+      <p:pic>
+        <p:nvPicPr>
+          <p:cNvPr id="26" name="Picture 25" descr="Icon&#10;&#10;Description automatically generated">
+            <a:extLst>
+              <a:ext uri="{FF2B5EF4-FFF2-40B4-BE49-F238E27FC236}">
+                <a16:creationId xmlns:a16="http://schemas.microsoft.com/office/drawing/2014/main" id="{2FED6DD5-2BD6-BBF4-0177-B70BCAADEACE}"/>
+              </a:ext>
+            </a:extLst>
+          </p:cNvPr>
+          <p:cNvPicPr>
+            <a:picLocks noChangeAspect="1"/>
+          </p:cNvPicPr>
+          <p:nvPr/>
+        </p:nvPicPr>
+        <p:blipFill>
+          <a:blip r:embed="rId6">
+            <a:extLst>
+              <a:ext uri="{28A0092B-C50C-407E-A947-70E740481C1C}">
+                <a14:useLocalDpi xmlns:a14="http://schemas.microsoft.com/office/drawing/2010/main" val="0"/>
+              </a:ext>
+            </a:extLst>
+          </a:blip>
+          <a:stretch>
+            <a:fillRect/>
+          </a:stretch>
+        </p:blipFill>
+        <p:spPr>
+          <a:xfrm>
+            <a:off x="17314094" y="10820658"/>
+            <a:ext cx="1778000" cy="1778000"/>
+          </a:xfrm>
+          <a:prstGeom prst="rect">
+            <a:avLst/>
+          </a:prstGeom>
+        </p:spPr>
+      </p:pic>
+      <p:pic>
+        <p:nvPicPr>
+          <p:cNvPr id="28" name="Graphic 27">
+            <a:extLst>
+              <a:ext uri="{FF2B5EF4-FFF2-40B4-BE49-F238E27FC236}">
+                <a16:creationId xmlns:a16="http://schemas.microsoft.com/office/drawing/2014/main" id="{D0166F6C-E1A8-8987-7D5C-06C0628AE246}"/>
+              </a:ext>
+            </a:extLst>
+          </p:cNvPr>
+          <p:cNvPicPr>
+            <a:picLocks noChangeAspect="1"/>
+          </p:cNvPicPr>
+          <p:nvPr/>
+        </p:nvPicPr>
+        <p:blipFill>
+          <a:blip r:embed="rId7">
+            <a:extLst>
+              <a:ext uri="{28A0092B-C50C-407E-A947-70E740481C1C}">
+                <a14:useLocalDpi xmlns:a14="http://schemas.microsoft.com/office/drawing/2010/main" val="0"/>
+              </a:ext>
+              <a:ext uri="{96DAC541-7B7A-43D3-8B79-37D633B846F1}">
+                <asvg:svgBlip xmlns:asvg="http://schemas.microsoft.com/office/drawing/2016/SVG/main" r:embed="rId8"/>
+              </a:ext>
+            </a:extLst>
+          </a:blip>
+          <a:stretch>
+            <a:fillRect/>
+          </a:stretch>
+        </p:blipFill>
+        <p:spPr>
+          <a:xfrm>
+            <a:off x="2485621" y="10139175"/>
+            <a:ext cx="2569103" cy="581421"/>
+          </a:xfrm>
+          <a:prstGeom prst="rect">
+            <a:avLst/>
+          </a:prstGeom>
+        </p:spPr>
+      </p:pic>
+      <p:pic>
+        <p:nvPicPr>
+          <p:cNvPr id="30" name="Picture 29" descr="Logo, icon&#10;&#10;Description automatically generated">
+            <a:extLst>
+              <a:ext uri="{FF2B5EF4-FFF2-40B4-BE49-F238E27FC236}">
+                <a16:creationId xmlns:a16="http://schemas.microsoft.com/office/drawing/2014/main" id="{D63039D1-75BF-8E35-CBA3-073469A0A205}"/>
+              </a:ext>
+            </a:extLst>
+          </p:cNvPr>
+          <p:cNvPicPr>
+            <a:picLocks noChangeAspect="1"/>
+          </p:cNvPicPr>
+          <p:nvPr/>
+        </p:nvPicPr>
+        <p:blipFill>
+          <a:blip r:embed="rId9">
+            <a:extLst>
+              <a:ext uri="{28A0092B-C50C-407E-A947-70E740481C1C}">
+                <a14:useLocalDpi xmlns:a14="http://schemas.microsoft.com/office/drawing/2010/main" val="0"/>
+              </a:ext>
+            </a:extLst>
+          </a:blip>
+          <a:stretch>
+            <a:fillRect/>
+          </a:stretch>
+        </p:blipFill>
+        <p:spPr>
+          <a:xfrm>
+            <a:off x="3257571" y="8434231"/>
+            <a:ext cx="1025204" cy="1150420"/>
+          </a:xfrm>
+          <a:prstGeom prst="rect">
+            <a:avLst/>
+          </a:prstGeom>
+        </p:spPr>
+      </p:pic>
+      <p:pic>
+        <p:nvPicPr>
+          <p:cNvPr id="38" name="Picture 37" descr="Shape&#10;&#10;Description automatically generated with low confidence">
+            <a:extLst>
+              <a:ext uri="{FF2B5EF4-FFF2-40B4-BE49-F238E27FC236}">
+                <a16:creationId xmlns:a16="http://schemas.microsoft.com/office/drawing/2014/main" id="{B96BD481-3F66-BA63-87AA-CE7989B8539F}"/>
+              </a:ext>
+            </a:extLst>
+          </p:cNvPr>
+          <p:cNvPicPr>
+            <a:picLocks noChangeAspect="1"/>
+          </p:cNvPicPr>
+          <p:nvPr/>
+        </p:nvPicPr>
+        <p:blipFill>
+          <a:blip r:embed="rId10">
+            <a:extLst>
+              <a:ext uri="{28A0092B-C50C-407E-A947-70E740481C1C}">
+                <a14:useLocalDpi xmlns:a14="http://schemas.microsoft.com/office/drawing/2010/main" val="0"/>
+              </a:ext>
+            </a:extLst>
+          </a:blip>
+          <a:stretch>
+            <a:fillRect/>
+          </a:stretch>
+        </p:blipFill>
+        <p:spPr>
+          <a:xfrm>
+            <a:off x="286320" y="9210853"/>
+            <a:ext cx="1058636" cy="1058636"/>
+          </a:xfrm>
+          <a:prstGeom prst="rect">
+            <a:avLst/>
+          </a:prstGeom>
+        </p:spPr>
+      </p:pic>
       <p:sp>
         <p:nvSpPr>
-          <p:cNvPr id="21" name="TextBox 20">
+          <p:cNvPr id="39" name="TextBox 38">
             <a:extLst>
               <a:ext uri="{FF2B5EF4-FFF2-40B4-BE49-F238E27FC236}">
-                <a16:creationId xmlns:a16="http://schemas.microsoft.com/office/drawing/2014/main" id="{9B41304E-C622-28E2-9775-8E10820B127E}"/>
+                <a16:creationId xmlns:a16="http://schemas.microsoft.com/office/drawing/2014/main" id="{7FA58538-CA08-BD6E-2D02-14BA40CAE7E9}"/>
               </a:ext>
             </a:extLst>
           </p:cNvPr>
@@ -8989,8 +9115,8 @@
         </p:nvSpPr>
         <p:spPr>
           <a:xfrm>
-            <a:off x="14777660" y="12565626"/>
-            <a:ext cx="6986579" cy="646331"/>
+            <a:off x="400093" y="10253451"/>
+            <a:ext cx="821410" cy="523220"/>
           </a:xfrm>
           <a:prstGeom prst="rect">
             <a:avLst/>
@@ -9005,12 +9131,252 @@
           <a:p>
             <a:pPr algn="ctr"/>
             <a:r>
-              <a:rPr lang="en-US" sz="3600" dirty="0"/>
-              <a:t>*Still haven’t finished this section*</a:t>
+              <a:rPr lang="en-US" sz="1400" dirty="0"/>
+              <a:t>Training Data</a:t>
             </a:r>
           </a:p>
         </p:txBody>
       </p:sp>
+      <p:sp>
+        <p:nvSpPr>
+          <p:cNvPr id="42" name="Oval 41">
+            <a:extLst>
+              <a:ext uri="{FF2B5EF4-FFF2-40B4-BE49-F238E27FC236}">
+                <a16:creationId xmlns:a16="http://schemas.microsoft.com/office/drawing/2014/main" id="{CA9AC509-866C-1411-14CF-41035384CF5A}"/>
+              </a:ext>
+            </a:extLst>
+          </p:cNvPr>
+          <p:cNvSpPr/>
+          <p:nvPr/>
+        </p:nvSpPr>
+        <p:spPr>
+          <a:xfrm>
+            <a:off x="1977682" y="8237527"/>
+            <a:ext cx="3626603" cy="3004208"/>
+          </a:xfrm>
+          <a:prstGeom prst="ellipse">
+            <a:avLst/>
+          </a:prstGeom>
+          <a:noFill/>
+        </p:spPr>
+        <p:style>
+          <a:lnRef idx="2">
+            <a:schemeClr val="accent1">
+              <a:shade val="50000"/>
+            </a:schemeClr>
+          </a:lnRef>
+          <a:fillRef idx="1">
+            <a:schemeClr val="accent1"/>
+          </a:fillRef>
+          <a:effectRef idx="0">
+            <a:schemeClr val="accent1"/>
+          </a:effectRef>
+          <a:fontRef idx="minor">
+            <a:schemeClr val="lt1"/>
+          </a:fontRef>
+        </p:style>
+        <p:txBody>
+          <a:bodyPr rtlCol="0" anchor="ctr"/>
+          <a:lstStyle/>
+          <a:p>
+            <a:pPr algn="ctr"/>
+            <a:endParaRPr lang="en-US" dirty="0"/>
+          </a:p>
+        </p:txBody>
+      </p:sp>
+      <p:sp>
+        <p:nvSpPr>
+          <p:cNvPr id="44" name="TextBox 43">
+            <a:extLst>
+              <a:ext uri="{FF2B5EF4-FFF2-40B4-BE49-F238E27FC236}">
+                <a16:creationId xmlns:a16="http://schemas.microsoft.com/office/drawing/2014/main" id="{4815FF89-D9A5-9E86-5CC6-6B692E2EC0F5}"/>
+              </a:ext>
+            </a:extLst>
+          </p:cNvPr>
+          <p:cNvSpPr txBox="1"/>
+          <p:nvPr/>
+        </p:nvSpPr>
+        <p:spPr>
+          <a:xfrm>
+            <a:off x="3543306" y="9614684"/>
+            <a:ext cx="453734" cy="584775"/>
+          </a:xfrm>
+          <a:prstGeom prst="rect">
+            <a:avLst/>
+          </a:prstGeom>
+          <a:noFill/>
+        </p:spPr>
+        <p:txBody>
+          <a:bodyPr wrap="square" rtlCol="0">
+            <a:spAutoFit/>
+          </a:bodyPr>
+          <a:lstStyle/>
+          <a:p>
+            <a:pPr algn="ctr"/>
+            <a:r>
+              <a:rPr lang="en-US" sz="3200" dirty="0"/>
+              <a:t>+</a:t>
+            </a:r>
+            <a:endParaRPr lang="en-US" dirty="0"/>
+          </a:p>
+        </p:txBody>
+      </p:sp>
+      <p:pic>
+        <p:nvPicPr>
+          <p:cNvPr id="45" name="Picture 44" descr="Shape&#10;&#10;Description automatically generated with low confidence">
+            <a:extLst>
+              <a:ext uri="{FF2B5EF4-FFF2-40B4-BE49-F238E27FC236}">
+                <a16:creationId xmlns:a16="http://schemas.microsoft.com/office/drawing/2014/main" id="{338879B3-8414-ED59-F4A2-8252E0AE24C0}"/>
+              </a:ext>
+            </a:extLst>
+          </p:cNvPr>
+          <p:cNvPicPr>
+            <a:picLocks noChangeAspect="1"/>
+          </p:cNvPicPr>
+          <p:nvPr/>
+        </p:nvPicPr>
+        <p:blipFill>
+          <a:blip r:embed="rId10">
+            <a:extLst>
+              <a:ext uri="{28A0092B-C50C-407E-A947-70E740481C1C}">
+                <a14:useLocalDpi xmlns:a14="http://schemas.microsoft.com/office/drawing/2010/main" val="0"/>
+              </a:ext>
+            </a:extLst>
+          </a:blip>
+          <a:stretch>
+            <a:fillRect/>
+          </a:stretch>
+        </p:blipFill>
+        <p:spPr>
+          <a:xfrm>
+            <a:off x="6175285" y="9210853"/>
+            <a:ext cx="1058636" cy="1058636"/>
+          </a:xfrm>
+          <a:prstGeom prst="rect">
+            <a:avLst/>
+          </a:prstGeom>
+        </p:spPr>
+      </p:pic>
+      <p:sp>
+        <p:nvSpPr>
+          <p:cNvPr id="46" name="TextBox 45">
+            <a:extLst>
+              <a:ext uri="{FF2B5EF4-FFF2-40B4-BE49-F238E27FC236}">
+                <a16:creationId xmlns:a16="http://schemas.microsoft.com/office/drawing/2014/main" id="{A0837B6B-D57D-04D7-7FBE-8A887C9308FB}"/>
+              </a:ext>
+            </a:extLst>
+          </p:cNvPr>
+          <p:cNvSpPr txBox="1"/>
+          <p:nvPr/>
+        </p:nvSpPr>
+        <p:spPr>
+          <a:xfrm>
+            <a:off x="6237011" y="10253451"/>
+            <a:ext cx="935183" cy="523220"/>
+          </a:xfrm>
+          <a:prstGeom prst="rect">
+            <a:avLst/>
+          </a:prstGeom>
+          <a:noFill/>
+        </p:spPr>
+        <p:txBody>
+          <a:bodyPr wrap="square" rtlCol="0">
+            <a:spAutoFit/>
+          </a:bodyPr>
+          <a:lstStyle/>
+          <a:p>
+            <a:pPr algn="ctr"/>
+            <a:r>
+              <a:rPr lang="en-US" sz="1400" dirty="0"/>
+              <a:t>Validation Data</a:t>
+            </a:r>
+          </a:p>
+        </p:txBody>
+      </p:sp>
+      <p:cxnSp>
+        <p:nvCxnSpPr>
+          <p:cNvPr id="48" name="Straight Arrow Connector 47">
+            <a:extLst>
+              <a:ext uri="{FF2B5EF4-FFF2-40B4-BE49-F238E27FC236}">
+                <a16:creationId xmlns:a16="http://schemas.microsoft.com/office/drawing/2014/main" id="{DA33C62C-78E1-1608-C773-8FA221D74246}"/>
+              </a:ext>
+            </a:extLst>
+          </p:cNvPr>
+          <p:cNvCxnSpPr>
+            <a:stCxn id="38" idx="3"/>
+            <a:endCxn id="42" idx="2"/>
+          </p:cNvCxnSpPr>
+          <p:nvPr/>
+        </p:nvCxnSpPr>
+        <p:spPr>
+          <a:xfrm flipV="1">
+            <a:off x="1344956" y="9739631"/>
+            <a:ext cx="632726" cy="540"/>
+          </a:xfrm>
+          <a:prstGeom prst="straightConnector1">
+            <a:avLst/>
+          </a:prstGeom>
+          <a:ln w="38100">
+            <a:tailEnd type="triangle"/>
+          </a:ln>
+        </p:spPr>
+        <p:style>
+          <a:lnRef idx="1">
+            <a:schemeClr val="accent1"/>
+          </a:lnRef>
+          <a:fillRef idx="0">
+            <a:schemeClr val="accent1"/>
+          </a:fillRef>
+          <a:effectRef idx="0">
+            <a:schemeClr val="accent1"/>
+          </a:effectRef>
+          <a:fontRef idx="minor">
+            <a:schemeClr val="tx1"/>
+          </a:fontRef>
+        </p:style>
+      </p:cxnSp>
+      <p:cxnSp>
+        <p:nvCxnSpPr>
+          <p:cNvPr id="50" name="Straight Arrow Connector 49">
+            <a:extLst>
+              <a:ext uri="{FF2B5EF4-FFF2-40B4-BE49-F238E27FC236}">
+                <a16:creationId xmlns:a16="http://schemas.microsoft.com/office/drawing/2014/main" id="{3856DC56-CDA8-03CB-A76D-453F423C5924}"/>
+              </a:ext>
+            </a:extLst>
+          </p:cNvPr>
+          <p:cNvCxnSpPr>
+            <a:stCxn id="42" idx="6"/>
+            <a:endCxn id="45" idx="1"/>
+          </p:cNvCxnSpPr>
+          <p:nvPr/>
+        </p:nvCxnSpPr>
+        <p:spPr>
+          <a:xfrm>
+            <a:off x="5604285" y="9739631"/>
+            <a:ext cx="571000" cy="540"/>
+          </a:xfrm>
+          <a:prstGeom prst="straightConnector1">
+            <a:avLst/>
+          </a:prstGeom>
+          <a:ln w="38100">
+            <a:tailEnd type="triangle"/>
+          </a:ln>
+        </p:spPr>
+        <p:style>
+          <a:lnRef idx="1">
+            <a:schemeClr val="accent1"/>
+          </a:lnRef>
+          <a:fillRef idx="0">
+            <a:schemeClr val="accent1"/>
+          </a:fillRef>
+          <a:effectRef idx="0">
+            <a:schemeClr val="accent1"/>
+          </a:effectRef>
+          <a:fontRef idx="minor">
+            <a:schemeClr val="tx1"/>
+          </a:fontRef>
+        </p:style>
+      </p:cxnSp>
     </p:spTree>
     <p:extLst>
       <p:ext uri="{BB962C8B-B14F-4D97-AF65-F5344CB8AC3E}">

</xml_diff>

<commit_message>
Nested vs not comparisons
</commit_message>
<xml_diff>
--- a/docs/poster.pptx
+++ b/docs/poster.pptx
@@ -225,7 +225,7 @@
             <a:fld id="{0158C5BC-9A70-462C-B28D-9600239EAC64}" type="datetimeFigureOut">
               <a:rPr lang="en-US" smtClean="0"/>
               <a:pPr/>
-              <a:t>2/18/23</a:t>
+              <a:t>2/19/23</a:t>
             </a:fld>
             <a:endParaRPr lang="en-US"/>
           </a:p>
@@ -392,7 +392,7 @@
             <a:fld id="{E6CC2317-6751-4CD4-9995-8782DD78E936}" type="datetimeFigureOut">
               <a:rPr lang="en-US" smtClean="0"/>
               <a:pPr/>
-              <a:t>2/18/23</a:t>
+              <a:t>2/19/23</a:t>
             </a:fld>
             <a:endParaRPr lang="en-US" dirty="0"/>
           </a:p>
@@ -7855,8 +7855,8 @@
           </a:p>
         </p:txBody>
       </p:sp>
-      <mc:AlternateContent xmlns:mc="http://schemas.openxmlformats.org/markup-compatibility/2006" xmlns:a14="http://schemas.microsoft.com/office/drawing/2010/main">
-        <mc:Choice Requires="a14">
+      <mc:AlternateContent xmlns:mc="http://schemas.openxmlformats.org/markup-compatibility/2006">
+        <mc:Choice xmlns:a14="http://schemas.microsoft.com/office/drawing/2010/main" Requires="a14">
           <p:sp>
             <p:nvSpPr>
               <p:cNvPr id="10" name="Text Placeholder 9">
@@ -7876,7 +7876,7 @@
             <p:spPr>
               <a:xfrm>
                 <a:off x="7513783" y="3342720"/>
-                <a:ext cx="6985298" cy="12793823"/>
+                <a:ext cx="6985298" cy="12495472"/>
               </a:xfrm>
             </p:spPr>
             <p:txBody>
@@ -7889,55 +7889,43 @@
                 </a:r>
               </a:p>
               <a:p>
+                <a:pPr marL="342900" indent="-342900">
+                  <a:buFont typeface="Arial" panose="020B0604020202020204" pitchFamily="34" charset="0"/>
+                  <a:buChar char="•"/>
+                </a:pPr>
                 <a:r>
                   <a:rPr lang="en-US" dirty="0"/>
-                  <a:t>This work focuses on the specific tree-based models known as GBMs. In a traditional modeling pipeline for GBMs, there are four main sources of randomness over which statisticians have some control:</a:t>
+                  <a:t>Boosting is a technique that combines several weak learners into one big model.</a:t>
                 </a:r>
               </a:p>
               <a:p>
-                <a:pPr marL="457200" indent="-457200">
-                  <a:buFont typeface="+mj-lt"/>
-                  <a:buAutoNum type="arabicPeriod"/>
+                <a:pPr marL="342900" indent="-342900">
+                  <a:buFont typeface="Arial" panose="020B0604020202020204" pitchFamily="34" charset="0"/>
+                  <a:buChar char="•"/>
                 </a:pPr>
                 <a:r>
                   <a:rPr lang="en-US" dirty="0"/>
-                  <a:t>How the data is split into training and validation sets.</a:t>
+                  <a:t>In GBMs, the weak learners are usually decision trees. </a:t>
                 </a:r>
               </a:p>
               <a:p>
-                <a:pPr marL="457200" indent="-457200">
-                  <a:buFont typeface="+mj-lt"/>
-                  <a:buAutoNum type="arabicPeriod"/>
+                <a:pPr marL="342900" indent="-342900">
+                  <a:buFont typeface="Arial" panose="020B0604020202020204" pitchFamily="34" charset="0"/>
+                  <a:buChar char="•"/>
                 </a:pPr>
                 <a:r>
                   <a:rPr lang="en-US" dirty="0"/>
-                  <a:t>Hyperparameter optimization procedures (e.g., Bayesian optimization).</a:t>
+                  <a:t>Two of the most popular implementations are XGBoost and LightGBM.</a:t>
                 </a:r>
               </a:p>
               <a:p>
-                <a:pPr marL="457200" indent="-457200">
-                  <a:buFont typeface="+mj-lt"/>
-                  <a:buAutoNum type="arabicPeriod"/>
+                <a:pPr marL="342900" indent="-342900">
+                  <a:buFont typeface="Arial" panose="020B0604020202020204" pitchFamily="34" charset="0"/>
+                  <a:buChar char="•"/>
                 </a:pPr>
                 <a:r>
                   <a:rPr lang="en-US" dirty="0"/>
-                  <a:t>GBM bootstrap samples.</a:t>
-                </a:r>
-              </a:p>
-              <a:p>
-                <a:pPr marL="457200" indent="-457200">
-                  <a:buFont typeface="+mj-lt"/>
-                  <a:buAutoNum type="arabicPeriod"/>
-                </a:pPr>
-                <a:r>
-                  <a:rPr lang="en-US" dirty="0"/>
-                  <a:t>GBM feature samples.</a:t>
-                </a:r>
-              </a:p>
-              <a:p>
-                <a:r>
-                  <a:rPr lang="en-US" dirty="0"/>
-                  <a:t>After multiple experiments, the first two were identified as the main sources of variability. These two sources of randomness are not specific to GBMs, so the methods mentioned here can be useful for any Machine Learning Algorithm.</a:t>
+                  <a:t>Hyperparameter tuning is crucial to avoid overfitting.</a:t>
                 </a:r>
               </a:p>
               <a:p>
@@ -7950,33 +7938,29 @@
                 </a:r>
               </a:p>
               <a:p>
+                <a:pPr marL="342900" indent="-342900">
+                  <a:buFont typeface="Arial" panose="020B0604020202020204" pitchFamily="34" charset="0"/>
+                  <a:buChar char="•"/>
+                </a:pPr>
                 <a:r>
                   <a:rPr lang="en-US" dirty="0"/>
                   <a:t>Cross validation (</a:t>
                 </a:r>
                 <a:r>
                   <a:rPr lang="en-US" i="1" dirty="0"/>
-                  <a:t>k-</a:t>
+                  <a:t>k</a:t>
                 </a:r>
                 <a:r>
                   <a:rPr lang="en-US" dirty="0"/>
-                  <a:t>fold CV) consists of splitting the training data into </a:t>
+                  <a:t>-fold CV): split training data into </a:t>
                 </a:r>
                 <a:r>
                   <a:rPr lang="en-US" i="1" dirty="0"/>
-                  <a:t>k </a:t>
+                  <a:t>k</a:t>
                 </a:r>
                 <a:r>
                   <a:rPr lang="en-US" dirty="0"/>
-                  <a:t>disjoint sets and using each of these sets as a validation set once and the other </a:t>
-                </a:r>
-                <a:r>
-                  <a:rPr lang="en-US" i="1" dirty="0"/>
-                  <a:t>k-1</a:t>
-                </a:r>
-                <a:r>
-                  <a:rPr lang="en-US" dirty="0"/>
-                  <a:t> as a training set.</a:t>
+                  <a:t> disjoint sets and use each as a validation set once.</a:t>
                 </a:r>
               </a:p>
               <a:p>
@@ -7986,7 +7970,7 @@
                 </a:pPr>
                 <a:r>
                   <a:rPr lang="en-US" dirty="0"/>
-                  <a:t>Large </a:t>
+                  <a:t>Repeated cross validation: perform </a:t>
                 </a:r>
                 <a:r>
                   <a:rPr lang="en-US" i="1" dirty="0"/>
@@ -7994,47 +7978,7 @@
                 </a:r>
                 <a:r>
                   <a:rPr lang="en-US" dirty="0"/>
-                  <a:t> implies </a:t>
-                </a:r>
-                <a:r>
-                  <a:rPr lang="en-US" b="1" dirty="0"/>
-                  <a:t>less bias and more variance.</a:t>
-                </a:r>
-              </a:p>
-              <a:p>
-                <a:pPr marL="342900" indent="-342900">
-                  <a:buFont typeface="Arial" panose="020B0604020202020204" pitchFamily="34" charset="0"/>
-                  <a:buChar char="•"/>
-                </a:pPr>
-                <a:r>
-                  <a:rPr lang="en-US" dirty="0"/>
-                  <a:t>Small </a:t>
-                </a:r>
-                <a:r>
-                  <a:rPr lang="en-US" i="1" dirty="0"/>
-                  <a:t>k</a:t>
-                </a:r>
-                <a:r>
-                  <a:rPr lang="en-US" dirty="0"/>
-                  <a:t> implies </a:t>
-                </a:r>
-                <a:r>
-                  <a:rPr lang="en-US" b="1" dirty="0"/>
-                  <a:t>more bias and less variance.</a:t>
-                </a:r>
-              </a:p>
-              <a:p>
-                <a:r>
-                  <a:rPr lang="en-US" dirty="0"/>
-                  <a:t>The idea of repeated cross validation is to repeat </a:t>
-                </a:r>
-                <a:r>
-                  <a:rPr lang="en-US" i="1" dirty="0"/>
-                  <a:t>k-</a:t>
-                </a:r>
-                <a:r>
-                  <a:rPr lang="en-US" dirty="0"/>
-                  <a:t>fold CV a total of </a:t>
+                  <a:t>-fold CV a total of </a:t>
                 </a:r>
                 <a:r>
                   <a:rPr lang="en-US" i="1" dirty="0"/>
@@ -8042,7 +7986,7 @@
                 </a:r>
                 <a:r>
                   <a:rPr lang="en-US" dirty="0"/>
-                  <a:t> times, to obtain a total of </a:t>
+                  <a:t> times to obtain </a:t>
                 </a:r>
                 <a14:m>
                   <m:oMath xmlns:m="http://schemas.openxmlformats.org/officeDocument/2006/math">
@@ -8074,10 +8018,75 @@
                 </a:r>
                 <a:r>
                   <a:rPr lang="en-US" dirty="0"/>
-                  <a:t>performance observations and avoid issues when choosing a “good” number of folds.</a:t>
+                  <a:t>performance observations.</a:t>
                 </a:r>
               </a:p>
               <a:p>
+                <a:pPr marL="342900" indent="-342900">
+                  <a:buFont typeface="Arial" panose="020B0604020202020204" pitchFamily="34" charset="0"/>
+                  <a:buChar char="•"/>
+                </a:pPr>
+                <a:r>
+                  <a:rPr lang="en-US" dirty="0"/>
+                  <a:t>Hyperparameter optimization using all the validation sets yield over-optimistic performance estimations.</a:t>
+                </a:r>
+              </a:p>
+              <a:p>
+                <a:pPr marL="342900" indent="-342900">
+                  <a:buFont typeface="Arial" panose="020B0604020202020204" pitchFamily="34" charset="0"/>
+                  <a:buChar char="•"/>
+                </a:pPr>
+                <a:endParaRPr lang="en-US" dirty="0"/>
+              </a:p>
+              <a:p>
+                <a:r>
+                  <a:rPr lang="en-US" b="1" dirty="0"/>
+                  <a:t>Nested Cross Validation</a:t>
+                </a:r>
+              </a:p>
+              <a:p>
+                <a:pPr marL="342900" indent="-342900">
+                  <a:buFont typeface="Arial" panose="020B0604020202020204" pitchFamily="34" charset="0"/>
+                  <a:buChar char="•"/>
+                </a:pPr>
+                <a:r>
+                  <a:rPr lang="en-US" dirty="0"/>
+                  <a:t>Within a cross validation fold, split the training set again using </a:t>
+                </a:r>
+                <a:r>
+                  <a:rPr lang="en-US" i="1" dirty="0"/>
+                  <a:t>k</a:t>
+                </a:r>
+                <a:r>
+                  <a:rPr lang="en-US" dirty="0"/>
+                  <a:t>-fold CV to tune hyperparameters.</a:t>
+                </a:r>
+              </a:p>
+              <a:p>
+                <a:pPr marL="342900" indent="-342900">
+                  <a:buFont typeface="Arial" panose="020B0604020202020204" pitchFamily="34" charset="0"/>
+                  <a:buChar char="•"/>
+                </a:pPr>
+                <a:r>
+                  <a:rPr lang="en-US" dirty="0"/>
+                  <a:t>Since the validation sets are not used to tune, performance observations are less biased in general.</a:t>
+                </a:r>
+              </a:p>
+              <a:p>
+                <a:pPr marL="342900" indent="-342900">
+                  <a:buFont typeface="Arial" panose="020B0604020202020204" pitchFamily="34" charset="0"/>
+                  <a:buChar char="•"/>
+                </a:pPr>
+                <a:r>
+                  <a:rPr lang="en-US" dirty="0"/>
+                  <a:t>Depending on the number of “outer” and “inner” folds, it can be computationally expensive.</a:t>
+                </a:r>
+              </a:p>
+              <a:p>
+                <a:pPr marL="342900" indent="-342900">
+                  <a:buFont typeface="Arial" panose="020B0604020202020204" pitchFamily="34" charset="0"/>
+                  <a:buChar char="•"/>
+                </a:pPr>
                 <a:endParaRPr lang="en-US" b="1" dirty="0"/>
               </a:p>
               <a:p>
@@ -8095,48 +8104,32 @@
                 </a:r>
               </a:p>
               <a:p>
+                <a:pPr marL="342900" indent="-342900">
+                  <a:buFont typeface="Arial" panose="020B0604020202020204" pitchFamily="34" charset="0"/>
+                  <a:buChar char="•"/>
+                </a:pPr>
                 <a:r>
                   <a:rPr lang="en-US" dirty="0"/>
-                  <a:t>A paired </a:t>
+                  <a:t>Statistically assess differences in performance using a paired </a:t>
                 </a:r>
                 <a:r>
                   <a:rPr lang="en-US" i="1" dirty="0"/>
-                  <a:t>t-</a:t>
+                  <a:t>t</a:t>
                 </a:r>
                 <a:r>
                   <a:rPr lang="en-US" dirty="0"/>
-                  <a:t>test can be performed with the </a:t>
-                </a:r>
-                <a14:m>
-                  <m:oMath xmlns:m="http://schemas.openxmlformats.org/officeDocument/2006/math">
-                    <m:r>
-                      <a:rPr lang="es-ES" b="0" i="1" smtClean="0">
-                        <a:latin typeface="Cambria Math" panose="02040503050406030204" pitchFamily="18" charset="0"/>
-                      </a:rPr>
-                      <m:t>𝑟</m:t>
-                    </m:r>
-                    <m:r>
-                      <a:rPr lang="es-ES" b="0" i="1" smtClean="0">
-                        <a:latin typeface="Cambria Math" panose="02040503050406030204" pitchFamily="18" charset="0"/>
-                        <a:ea typeface="Cambria Math" panose="02040503050406030204" pitchFamily="18" charset="0"/>
-                      </a:rPr>
-                      <m:t>×</m:t>
-                    </m:r>
-                    <m:r>
-                      <a:rPr lang="es-ES" b="0" i="1" smtClean="0">
-                        <a:latin typeface="Cambria Math" panose="02040503050406030204" pitchFamily="18" charset="0"/>
-                        <a:ea typeface="Cambria Math" panose="02040503050406030204" pitchFamily="18" charset="0"/>
-                      </a:rPr>
-                      <m:t>𝑘</m:t>
-                    </m:r>
-                  </m:oMath>
-                </a14:m>
-                <a:r>
-                  <a:rPr lang="en-US" dirty="0"/>
-                  <a:t> performance observations to test whether one model is significantly better than another. Since observations are not independent due to cross validation, an adjustment [1] must be made to achieve desired type I error probabilities:</a:t>
+                  <a:t>-test.</a:t>
                 </a:r>
               </a:p>
               <a:p>
+                <a:pPr marL="342900" indent="-342900">
+                  <a:buFont typeface="Arial" panose="020B0604020202020204" pitchFamily="34" charset="0"/>
+                  <a:buChar char="•"/>
+                </a:pPr>
+                <a:r>
+                  <a:rPr lang="en-US" dirty="0"/>
+                  <a:t>Need to account for the fact that training sets in cross validation are not independent to stabilize type I error rates [1].</a:t>
+                </a:r>
                 <a:endParaRPr lang="en-US" b="1" dirty="0"/>
               </a:p>
               <a:p>
@@ -8464,7 +8457,7 @@
             </p:txBody>
           </p:sp>
         </mc:Choice>
-        <mc:Fallback xmlns="">
+        <mc:Fallback>
           <p:sp>
             <p:nvSpPr>
               <p:cNvPr id="10" name="Text Placeholder 9">
@@ -8484,7 +8477,7 @@
             <p:spPr>
               <a:xfrm>
                 <a:off x="7513783" y="3342720"/>
-                <a:ext cx="6985298" cy="12793823"/>
+                <a:ext cx="6985298" cy="12495472"/>
               </a:xfrm>
               <a:blipFill>
                 <a:blip r:embed="rId2"/>
@@ -8565,25 +8558,40 @@
         <p:spPr>
           <a:xfrm>
             <a:off x="14778942" y="3342108"/>
-            <a:ext cx="6985298" cy="3631763"/>
+            <a:ext cx="6985298" cy="2400657"/>
           </a:xfrm>
         </p:spPr>
         <p:txBody>
           <a:bodyPr/>
           <a:lstStyle/>
           <a:p>
+            <a:pPr marL="342900" indent="-342900">
+              <a:buFont typeface="Arial" panose="020B0604020202020204" pitchFamily="34" charset="0"/>
+              <a:buChar char="•"/>
+            </a:pPr>
             <a:r>
               <a:rPr lang="en-US" dirty="0"/>
-              <a:t>The models and methods introduced are applied in a real-life scenario using insurance data from a Kaggle competition [2]. The goal is to predict the severity of claims for multiple policies issued by the company.</a:t>
-            </a:r>
-          </a:p>
-          <a:p>
-            <a:endParaRPr lang="en-US" dirty="0"/>
-          </a:p>
-          <a:p>
+              <a:t>Claim severity data from a Kaggle competition [2].</a:t>
+            </a:r>
+          </a:p>
+          <a:p>
+            <a:pPr marL="342900" indent="-342900">
+              <a:buFont typeface="Arial" panose="020B0604020202020204" pitchFamily="34" charset="0"/>
+              <a:buChar char="•"/>
+            </a:pPr>
             <a:r>
               <a:rPr lang="en-US" dirty="0"/>
-              <a:t>The training data set consists of 194,000 policies. The columns are an ID column, a continuous response column (average claim severity for each policy), 116 categorical predictors, and 14 numerical predictors.</a:t>
+              <a:t>The goal is to predict the severity associated with each claim (continuous response).</a:t>
+            </a:r>
+          </a:p>
+          <a:p>
+            <a:pPr marL="342900" indent="-342900">
+              <a:buFont typeface="Arial" panose="020B0604020202020204" pitchFamily="34" charset="0"/>
+              <a:buChar char="•"/>
+            </a:pPr>
+            <a:r>
+              <a:rPr lang="en-US" dirty="0"/>
+              <a:t>194,000 claims, 116 categorical predictors, 14 numerical predictors.</a:t>
             </a:r>
           </a:p>
         </p:txBody>
@@ -8920,10 +8928,10 @@
       </p:sp>
       <p:pic>
         <p:nvPicPr>
-          <p:cNvPr id="24" name="Picture 23" descr="Icon&#10;&#10;Description automatically generated">
+          <p:cNvPr id="28" name="Graphic 27">
             <a:extLst>
               <a:ext uri="{FF2B5EF4-FFF2-40B4-BE49-F238E27FC236}">
-                <a16:creationId xmlns:a16="http://schemas.microsoft.com/office/drawing/2014/main" id="{AAF8F5C0-6D52-D6CE-A2BD-552379EC27A1}"/>
+                <a16:creationId xmlns:a16="http://schemas.microsoft.com/office/drawing/2014/main" id="{D0166F6C-E1A8-8987-7D5C-06C0628AE246}"/>
               </a:ext>
             </a:extLst>
           </p:cNvPr>
@@ -8938,80 +8946,8 @@
               <a:ext uri="{28A0092B-C50C-407E-A947-70E740481C1C}">
                 <a14:useLocalDpi xmlns:a14="http://schemas.microsoft.com/office/drawing/2010/main" val="0"/>
               </a:ext>
-            </a:extLst>
-          </a:blip>
-          <a:stretch>
-            <a:fillRect/>
-          </a:stretch>
-        </p:blipFill>
-        <p:spPr>
-          <a:xfrm>
-            <a:off x="14793171" y="10693250"/>
-            <a:ext cx="1652116" cy="1645688"/>
-          </a:xfrm>
-          <a:prstGeom prst="rect">
-            <a:avLst/>
-          </a:prstGeom>
-        </p:spPr>
-      </p:pic>
-      <p:pic>
-        <p:nvPicPr>
-          <p:cNvPr id="26" name="Picture 25" descr="Icon&#10;&#10;Description automatically generated">
-            <a:extLst>
-              <a:ext uri="{FF2B5EF4-FFF2-40B4-BE49-F238E27FC236}">
-                <a16:creationId xmlns:a16="http://schemas.microsoft.com/office/drawing/2014/main" id="{2FED6DD5-2BD6-BBF4-0177-B70BCAADEACE}"/>
-              </a:ext>
-            </a:extLst>
-          </p:cNvPr>
-          <p:cNvPicPr>
-            <a:picLocks noChangeAspect="1"/>
-          </p:cNvPicPr>
-          <p:nvPr/>
-        </p:nvPicPr>
-        <p:blipFill>
-          <a:blip r:embed="rId6">
-            <a:extLst>
-              <a:ext uri="{28A0092B-C50C-407E-A947-70E740481C1C}">
-                <a14:useLocalDpi xmlns:a14="http://schemas.microsoft.com/office/drawing/2010/main" val="0"/>
-              </a:ext>
-            </a:extLst>
-          </a:blip>
-          <a:stretch>
-            <a:fillRect/>
-          </a:stretch>
-        </p:blipFill>
-        <p:spPr>
-          <a:xfrm>
-            <a:off x="17314094" y="10820658"/>
-            <a:ext cx="1778000" cy="1778000"/>
-          </a:xfrm>
-          <a:prstGeom prst="rect">
-            <a:avLst/>
-          </a:prstGeom>
-        </p:spPr>
-      </p:pic>
-      <p:pic>
-        <p:nvPicPr>
-          <p:cNvPr id="28" name="Graphic 27">
-            <a:extLst>
-              <a:ext uri="{FF2B5EF4-FFF2-40B4-BE49-F238E27FC236}">
-                <a16:creationId xmlns:a16="http://schemas.microsoft.com/office/drawing/2014/main" id="{D0166F6C-E1A8-8987-7D5C-06C0628AE246}"/>
-              </a:ext>
-            </a:extLst>
-          </p:cNvPr>
-          <p:cNvPicPr>
-            <a:picLocks noChangeAspect="1"/>
-          </p:cNvPicPr>
-          <p:nvPr/>
-        </p:nvPicPr>
-        <p:blipFill>
-          <a:blip r:embed="rId7">
-            <a:extLst>
-              <a:ext uri="{28A0092B-C50C-407E-A947-70E740481C1C}">
-                <a14:useLocalDpi xmlns:a14="http://schemas.microsoft.com/office/drawing/2010/main" val="0"/>
-              </a:ext>
               <a:ext uri="{96DAC541-7B7A-43D3-8B79-37D633B846F1}">
-                <asvg:svgBlip xmlns:asvg="http://schemas.microsoft.com/office/drawing/2016/SVG/main" r:embed="rId8"/>
+                <asvg:svgBlip xmlns:asvg="http://schemas.microsoft.com/office/drawing/2016/SVG/main" r:embed="rId6"/>
               </a:ext>
             </a:extLst>
           </a:blip>
@@ -9044,7 +8980,7 @@
           <p:nvPr/>
         </p:nvPicPr>
         <p:blipFill>
-          <a:blip r:embed="rId9">
+          <a:blip r:embed="rId7">
             <a:extLst>
               <a:ext uri="{28A0092B-C50C-407E-A947-70E740481C1C}">
                 <a14:useLocalDpi xmlns:a14="http://schemas.microsoft.com/office/drawing/2010/main" val="0"/>
@@ -9080,7 +9016,7 @@
           <p:nvPr/>
         </p:nvPicPr>
         <p:blipFill>
-          <a:blip r:embed="rId10">
+          <a:blip r:embed="rId8">
             <a:extLst>
               <a:ext uri="{28A0092B-C50C-407E-A947-70E740481C1C}">
                 <a14:useLocalDpi xmlns:a14="http://schemas.microsoft.com/office/drawing/2010/main" val="0"/>
@@ -9236,7 +9172,7 @@
           <p:nvPr/>
         </p:nvPicPr>
         <p:blipFill>
-          <a:blip r:embed="rId10">
+          <a:blip r:embed="rId8">
             <a:extLst>
               <a:ext uri="{28A0092B-C50C-407E-A947-70E740481C1C}">
                 <a14:useLocalDpi xmlns:a14="http://schemas.microsoft.com/office/drawing/2010/main" val="0"/>

</xml_diff>

<commit_message>
Fit reduced and full models for test
</commit_message>
<xml_diff>
--- a/docs/poster.pptx
+++ b/docs/poster.pptx
@@ -225,7 +225,7 @@
             <a:fld id="{0158C5BC-9A70-462C-B28D-9600239EAC64}" type="datetimeFigureOut">
               <a:rPr lang="en-US" smtClean="0"/>
               <a:pPr/>
-              <a:t>2/19/23</a:t>
+              <a:t>2/20/23</a:t>
             </a:fld>
             <a:endParaRPr lang="en-US"/>
           </a:p>
@@ -392,7 +392,7 @@
             <a:fld id="{E6CC2317-6751-4CD4-9995-8782DD78E936}" type="datetimeFigureOut">
               <a:rPr lang="en-US" smtClean="0"/>
               <a:pPr/>
-              <a:t>2/19/23</a:t>
+              <a:t>2/20/23</a:t>
             </a:fld>
             <a:endParaRPr lang="en-US" dirty="0"/>
           </a:p>
@@ -7682,7 +7682,7 @@
             </a:r>
             <a:r>
               <a:rPr lang="en-US" dirty="0"/>
-              <a:t>New regulation states that insurance companies cannot use a certain client characteristic in pricing models. How does the removal of this predictor affect model performance?</a:t>
+              <a:t>New regulation states that insurance companies cannot use certain client characteristics in pricing models. How does the removal of these predictors affect model performance?</a:t>
             </a:r>
             <a:endParaRPr lang="en-US" b="1" dirty="0"/>
           </a:p>
@@ -7706,7 +7706,7 @@
         </p:nvSpPr>
         <p:spPr>
           <a:xfrm>
-            <a:off x="272740" y="12598658"/>
+            <a:off x="272740" y="11720834"/>
             <a:ext cx="6985298" cy="387798"/>
           </a:xfrm>
           <a:solidFill>
@@ -7751,7 +7751,7 @@
         </p:nvSpPr>
         <p:spPr>
           <a:xfrm>
-            <a:off x="262306" y="12998769"/>
+            <a:off x="262306" y="12120945"/>
             <a:ext cx="6995731" cy="3077766"/>
           </a:xfrm>
           <a:ln w="19050">
@@ -7934,7 +7934,7 @@
               <a:p>
                 <a:r>
                   <a:rPr lang="en-US" b="1" dirty="0"/>
-                  <a:t>Repeated Cross Validation</a:t>
+                  <a:t>Repeated Cross Validation (RCV)</a:t>
                 </a:r>
               </a:p>
               <a:p>
@@ -8041,7 +8041,7 @@
               <a:p>
                 <a:r>
                   <a:rPr lang="en-US" b="1" dirty="0"/>
-                  <a:t>Nested Cross Validation</a:t>
+                  <a:t>Nested Cross Validation (NCV)</a:t>
                 </a:r>
               </a:p>
               <a:p>
@@ -8083,10 +8083,6 @@
                 </a:r>
               </a:p>
               <a:p>
-                <a:pPr marL="342900" indent="-342900">
-                  <a:buFont typeface="Arial" panose="020B0604020202020204" pitchFamily="34" charset="0"/>
-                  <a:buChar char="•"/>
-                </a:pPr>
                 <a:endParaRPr lang="en-US" b="1" dirty="0"/>
               </a:p>
               <a:p>
@@ -8557,8 +8553,8 @@
         </p:nvSpPr>
         <p:spPr>
           <a:xfrm>
-            <a:off x="14778942" y="3342108"/>
-            <a:ext cx="6985298" cy="2400657"/>
+            <a:off x="14778942" y="3338381"/>
+            <a:ext cx="6985298" cy="2074975"/>
           </a:xfrm>
         </p:spPr>
         <p:txBody>
@@ -8581,7 +8577,7 @@
             </a:pPr>
             <a:r>
               <a:rPr lang="en-US" dirty="0"/>
-              <a:t>The goal is to predict the severity associated with each claim (continuous response).</a:t>
+              <a:t>The goal is to predict the severity associated with each claim (continuous response, MAE loss).</a:t>
             </a:r>
           </a:p>
           <a:p>
@@ -9313,6 +9309,1226 @@
           </a:fontRef>
         </p:style>
       </p:cxnSp>
+      <p:graphicFrame>
+        <p:nvGraphicFramePr>
+          <p:cNvPr id="20" name="Table 20">
+            <a:extLst>
+              <a:ext uri="{FF2B5EF4-FFF2-40B4-BE49-F238E27FC236}">
+                <a16:creationId xmlns:a16="http://schemas.microsoft.com/office/drawing/2014/main" id="{840AECC3-FE6D-3276-0C4B-DAC77D3BE9FB}"/>
+              </a:ext>
+            </a:extLst>
+          </p:cNvPr>
+          <p:cNvGraphicFramePr>
+            <a:graphicFrameLocks noGrp="1"/>
+          </p:cNvGraphicFramePr>
+          <p:nvPr>
+            <p:extLst>
+              <p:ext uri="{D42A27DB-BD31-4B8C-83A1-F6EECF244321}">
+                <p14:modId xmlns:p14="http://schemas.microsoft.com/office/powerpoint/2010/main" val="3232558727"/>
+              </p:ext>
+            </p:extLst>
+          </p:nvPr>
+        </p:nvGraphicFramePr>
+        <p:xfrm>
+          <a:off x="14937764" y="5841020"/>
+          <a:ext cx="6667652" cy="1005840"/>
+        </p:xfrm>
+        <a:graphic>
+          <a:graphicData uri="http://schemas.openxmlformats.org/drawingml/2006/table">
+            <a:tbl>
+              <a:tblPr firstRow="1" bandRow="1">
+                <a:tableStyleId>{5C22544A-7EE6-4342-B048-85BDC9FD1C3A}</a:tableStyleId>
+              </a:tblPr>
+              <a:tblGrid>
+                <a:gridCol w="1666913">
+                  <a:extLst>
+                    <a:ext uri="{9D8B030D-6E8A-4147-A177-3AD203B41FA5}">
+                      <a16:colId xmlns:a16="http://schemas.microsoft.com/office/drawing/2014/main" val="1957464870"/>
+                    </a:ext>
+                  </a:extLst>
+                </a:gridCol>
+                <a:gridCol w="1666913">
+                  <a:extLst>
+                    <a:ext uri="{9D8B030D-6E8A-4147-A177-3AD203B41FA5}">
+                      <a16:colId xmlns:a16="http://schemas.microsoft.com/office/drawing/2014/main" val="2781740689"/>
+                    </a:ext>
+                  </a:extLst>
+                </a:gridCol>
+                <a:gridCol w="1666913">
+                  <a:extLst>
+                    <a:ext uri="{9D8B030D-6E8A-4147-A177-3AD203B41FA5}">
+                      <a16:colId xmlns:a16="http://schemas.microsoft.com/office/drawing/2014/main" val="3730805822"/>
+                    </a:ext>
+                  </a:extLst>
+                </a:gridCol>
+                <a:gridCol w="1666913">
+                  <a:extLst>
+                    <a:ext uri="{9D8B030D-6E8A-4147-A177-3AD203B41FA5}">
+                      <a16:colId xmlns:a16="http://schemas.microsoft.com/office/drawing/2014/main" val="3385206762"/>
+                    </a:ext>
+                  </a:extLst>
+                </a:gridCol>
+              </a:tblGrid>
+              <a:tr h="0">
+                <a:tc>
+                  <a:txBody>
+                    <a:bodyPr/>
+                    <a:lstStyle/>
+                    <a:p>
+                      <a:pPr algn="ctr"/>
+                      <a:r>
+                        <a:rPr lang="en-US" sz="1600" dirty="0"/>
+                        <a:t>Cross Validation</a:t>
+                      </a:r>
+                    </a:p>
+                  </a:txBody>
+                  <a:tcPr anchor="ctr"/>
+                </a:tc>
+                <a:tc>
+                  <a:txBody>
+                    <a:bodyPr/>
+                    <a:lstStyle/>
+                    <a:p>
+                      <a:pPr algn="ctr"/>
+                      <a:r>
+                        <a:rPr lang="en-US" sz="1600" dirty="0"/>
+                        <a:t>Avg. MAE</a:t>
+                      </a:r>
+                    </a:p>
+                  </a:txBody>
+                  <a:tcPr anchor="ctr"/>
+                </a:tc>
+                <a:tc>
+                  <a:txBody>
+                    <a:bodyPr/>
+                    <a:lstStyle/>
+                    <a:p>
+                      <a:pPr algn="ctr"/>
+                      <a:r>
+                        <a:rPr lang="en-US" sz="1600" dirty="0"/>
+                        <a:t>SD MAE</a:t>
+                      </a:r>
+                    </a:p>
+                  </a:txBody>
+                  <a:tcPr anchor="ctr"/>
+                </a:tc>
+                <a:tc>
+                  <a:txBody>
+                    <a:bodyPr/>
+                    <a:lstStyle/>
+                    <a:p>
+                      <a:pPr algn="ctr"/>
+                      <a:r>
+                        <a:rPr lang="en-US" sz="1600" dirty="0"/>
+                        <a:t>Time*</a:t>
+                      </a:r>
+                    </a:p>
+                  </a:txBody>
+                  <a:tcPr anchor="ctr"/>
+                </a:tc>
+                <a:extLst>
+                  <a:ext uri="{0D108BD9-81ED-4DB2-BD59-A6C34878D82A}">
+                    <a16:rowId xmlns:a16="http://schemas.microsoft.com/office/drawing/2014/main" val="1084369413"/>
+                  </a:ext>
+                </a:extLst>
+              </a:tr>
+              <a:tr h="0">
+                <a:tc>
+                  <a:txBody>
+                    <a:bodyPr/>
+                    <a:lstStyle/>
+                    <a:p>
+                      <a:pPr algn="ctr"/>
+                      <a:r>
+                        <a:rPr lang="en-US" sz="1600" dirty="0"/>
+                        <a:t>Nested RCV</a:t>
+                      </a:r>
+                    </a:p>
+                  </a:txBody>
+                  <a:tcPr anchor="ctr"/>
+                </a:tc>
+                <a:tc>
+                  <a:txBody>
+                    <a:bodyPr/>
+                    <a:lstStyle/>
+                    <a:p>
+                      <a:pPr algn="ctr"/>
+                      <a:r>
+                        <a:rPr lang="en-US" sz="1600" dirty="0"/>
+                        <a:t>1149.73</a:t>
+                      </a:r>
+                    </a:p>
+                  </a:txBody>
+                  <a:tcPr anchor="ctr"/>
+                </a:tc>
+                <a:tc>
+                  <a:txBody>
+                    <a:bodyPr/>
+                    <a:lstStyle/>
+                    <a:p>
+                      <a:pPr algn="ctr"/>
+                      <a:r>
+                        <a:rPr lang="en-US" sz="1600" dirty="0"/>
+                        <a:t>10.52</a:t>
+                      </a:r>
+                    </a:p>
+                  </a:txBody>
+                  <a:tcPr anchor="ctr"/>
+                </a:tc>
+                <a:tc>
+                  <a:txBody>
+                    <a:bodyPr/>
+                    <a:lstStyle/>
+                    <a:p>
+                      <a:pPr algn="ctr"/>
+                      <a:r>
+                        <a:rPr lang="en-US" sz="1600" dirty="0"/>
+                        <a:t>2h 35m</a:t>
+                      </a:r>
+                    </a:p>
+                  </a:txBody>
+                  <a:tcPr anchor="ctr"/>
+                </a:tc>
+                <a:extLst>
+                  <a:ext uri="{0D108BD9-81ED-4DB2-BD59-A6C34878D82A}">
+                    <a16:rowId xmlns:a16="http://schemas.microsoft.com/office/drawing/2014/main" val="1227903077"/>
+                  </a:ext>
+                </a:extLst>
+              </a:tr>
+              <a:tr h="0">
+                <a:tc>
+                  <a:txBody>
+                    <a:bodyPr/>
+                    <a:lstStyle/>
+                    <a:p>
+                      <a:pPr algn="ctr"/>
+                      <a:r>
+                        <a:rPr lang="en-US" sz="1600" dirty="0"/>
+                        <a:t>Non-nested RCV</a:t>
+                      </a:r>
+                    </a:p>
+                  </a:txBody>
+                  <a:tcPr anchor="ctr"/>
+                </a:tc>
+                <a:tc>
+                  <a:txBody>
+                    <a:bodyPr/>
+                    <a:lstStyle/>
+                    <a:p>
+                      <a:pPr algn="ctr"/>
+                      <a:r>
+                        <a:rPr lang="en-US" sz="1600" dirty="0"/>
+                        <a:t>1148.85</a:t>
+                      </a:r>
+                    </a:p>
+                  </a:txBody>
+                  <a:tcPr anchor="ctr"/>
+                </a:tc>
+                <a:tc>
+                  <a:txBody>
+                    <a:bodyPr/>
+                    <a:lstStyle/>
+                    <a:p>
+                      <a:pPr algn="ctr"/>
+                      <a:r>
+                        <a:rPr lang="en-US" sz="1600" dirty="0"/>
+                        <a:t>9.69</a:t>
+                      </a:r>
+                    </a:p>
+                  </a:txBody>
+                  <a:tcPr anchor="ctr"/>
+                </a:tc>
+                <a:tc>
+                  <a:txBody>
+                    <a:bodyPr/>
+                    <a:lstStyle/>
+                    <a:p>
+                      <a:pPr algn="ctr"/>
+                      <a:r>
+                        <a:rPr lang="en-US" sz="1600" dirty="0"/>
+                        <a:t>1h 2m</a:t>
+                      </a:r>
+                    </a:p>
+                  </a:txBody>
+                  <a:tcPr anchor="ctr"/>
+                </a:tc>
+                <a:extLst>
+                  <a:ext uri="{0D108BD9-81ED-4DB2-BD59-A6C34878D82A}">
+                    <a16:rowId xmlns:a16="http://schemas.microsoft.com/office/drawing/2014/main" val="23211046"/>
+                  </a:ext>
+                </a:extLst>
+              </a:tr>
+            </a:tbl>
+          </a:graphicData>
+        </a:graphic>
+      </p:graphicFrame>
+      <p:sp>
+        <p:nvSpPr>
+          <p:cNvPr id="23" name="TextBox 22">
+            <a:extLst>
+              <a:ext uri="{FF2B5EF4-FFF2-40B4-BE49-F238E27FC236}">
+                <a16:creationId xmlns:a16="http://schemas.microsoft.com/office/drawing/2014/main" id="{D76FCA8F-A63A-6295-AAE5-FD5485133CBB}"/>
+              </a:ext>
+            </a:extLst>
+          </p:cNvPr>
+          <p:cNvSpPr txBox="1"/>
+          <p:nvPr/>
+        </p:nvSpPr>
+        <p:spPr>
+          <a:xfrm>
+            <a:off x="14915524" y="6828102"/>
+            <a:ext cx="7002680" cy="276999"/>
+          </a:xfrm>
+          <a:prstGeom prst="rect">
+            <a:avLst/>
+          </a:prstGeom>
+          <a:noFill/>
+        </p:spPr>
+        <p:txBody>
+          <a:bodyPr wrap="square" rtlCol="0">
+            <a:spAutoFit/>
+          </a:bodyPr>
+          <a:lstStyle/>
+          <a:p>
+            <a:r>
+              <a:rPr lang="en-US" sz="1200" dirty="0"/>
+              <a:t>* Tested using 5 cores in parallel on a 2022 MacBook Air with 8 GB RAM and M2 chip (MacOS Ventura 13.1).</a:t>
+            </a:r>
+          </a:p>
+        </p:txBody>
+      </p:sp>
+      <p:pic>
+        <p:nvPicPr>
+          <p:cNvPr id="27" name="Picture 26">
+            <a:extLst>
+              <a:ext uri="{FF2B5EF4-FFF2-40B4-BE49-F238E27FC236}">
+                <a16:creationId xmlns:a16="http://schemas.microsoft.com/office/drawing/2014/main" id="{46A26B1E-4554-45E9-D4E0-1C11D4D0D1FC}"/>
+              </a:ext>
+            </a:extLst>
+          </p:cNvPr>
+          <p:cNvPicPr>
+            <a:picLocks noChangeAspect="1"/>
+          </p:cNvPicPr>
+          <p:nvPr/>
+        </p:nvPicPr>
+        <p:blipFill>
+          <a:blip r:embed="rId9">
+            <a:extLst>
+              <a:ext uri="{28A0092B-C50C-407E-A947-70E740481C1C}">
+                <a14:useLocalDpi xmlns:a14="http://schemas.microsoft.com/office/drawing/2010/main" val="0"/>
+              </a:ext>
+            </a:extLst>
+          </a:blip>
+          <a:srcRect/>
+          <a:stretch/>
+        </p:blipFill>
+        <p:spPr>
+          <a:xfrm>
+            <a:off x="14937765" y="9009441"/>
+            <a:ext cx="6667651" cy="3590274"/>
+          </a:xfrm>
+          <a:prstGeom prst="rect">
+            <a:avLst/>
+          </a:prstGeom>
+        </p:spPr>
+      </p:pic>
+      <p:graphicFrame>
+        <p:nvGraphicFramePr>
+          <p:cNvPr id="32" name="Table 32">
+            <a:extLst>
+              <a:ext uri="{FF2B5EF4-FFF2-40B4-BE49-F238E27FC236}">
+                <a16:creationId xmlns:a16="http://schemas.microsoft.com/office/drawing/2014/main" id="{C2CB50BB-8F5E-C957-0FA7-73E897791204}"/>
+              </a:ext>
+            </a:extLst>
+          </p:cNvPr>
+          <p:cNvGraphicFramePr>
+            <a:graphicFrameLocks noGrp="1"/>
+          </p:cNvGraphicFramePr>
+          <p:nvPr>
+            <p:extLst>
+              <p:ext uri="{D42A27DB-BD31-4B8C-83A1-F6EECF244321}">
+                <p14:modId xmlns:p14="http://schemas.microsoft.com/office/powerpoint/2010/main" val="1193051932"/>
+              </p:ext>
+            </p:extLst>
+          </p:nvPr>
+        </p:nvGraphicFramePr>
+        <p:xfrm>
+          <a:off x="14897291" y="12985556"/>
+          <a:ext cx="6667650" cy="1005840"/>
+        </p:xfrm>
+        <a:graphic>
+          <a:graphicData uri="http://schemas.openxmlformats.org/drawingml/2006/table">
+            <a:tbl>
+              <a:tblPr firstRow="1" bandRow="1">
+                <a:tableStyleId>{5C22544A-7EE6-4342-B048-85BDC9FD1C3A}</a:tableStyleId>
+              </a:tblPr>
+              <a:tblGrid>
+                <a:gridCol w="1333530">
+                  <a:extLst>
+                    <a:ext uri="{9D8B030D-6E8A-4147-A177-3AD203B41FA5}">
+                      <a16:colId xmlns:a16="http://schemas.microsoft.com/office/drawing/2014/main" val="3984412085"/>
+                    </a:ext>
+                  </a:extLst>
+                </a:gridCol>
+                <a:gridCol w="1333530">
+                  <a:extLst>
+                    <a:ext uri="{9D8B030D-6E8A-4147-A177-3AD203B41FA5}">
+                      <a16:colId xmlns:a16="http://schemas.microsoft.com/office/drawing/2014/main" val="868282736"/>
+                    </a:ext>
+                  </a:extLst>
+                </a:gridCol>
+                <a:gridCol w="1333530">
+                  <a:extLst>
+                    <a:ext uri="{9D8B030D-6E8A-4147-A177-3AD203B41FA5}">
+                      <a16:colId xmlns:a16="http://schemas.microsoft.com/office/drawing/2014/main" val="1330813819"/>
+                    </a:ext>
+                  </a:extLst>
+                </a:gridCol>
+                <a:gridCol w="1333530">
+                  <a:extLst>
+                    <a:ext uri="{9D8B030D-6E8A-4147-A177-3AD203B41FA5}">
+                      <a16:colId xmlns:a16="http://schemas.microsoft.com/office/drawing/2014/main" val="3565910152"/>
+                    </a:ext>
+                  </a:extLst>
+                </a:gridCol>
+                <a:gridCol w="1333530">
+                  <a:extLst>
+                    <a:ext uri="{9D8B030D-6E8A-4147-A177-3AD203B41FA5}">
+                      <a16:colId xmlns:a16="http://schemas.microsoft.com/office/drawing/2014/main" val="1693654350"/>
+                    </a:ext>
+                  </a:extLst>
+                </a:gridCol>
+              </a:tblGrid>
+              <a:tr h="0">
+                <a:tc>
+                  <a:txBody>
+                    <a:bodyPr/>
+                    <a:lstStyle/>
+                    <a:p>
+                      <a:pPr algn="ctr"/>
+                      <a:r>
+                        <a:rPr lang="en-US" sz="1600" dirty="0"/>
+                        <a:t>Model</a:t>
+                      </a:r>
+                    </a:p>
+                  </a:txBody>
+                  <a:tcPr anchor="ctr"/>
+                </a:tc>
+                <a:tc>
+                  <a:txBody>
+                    <a:bodyPr/>
+                    <a:lstStyle/>
+                    <a:p>
+                      <a:pPr algn="ctr"/>
+                      <a:r>
+                        <a:rPr lang="en-US" sz="1600" dirty="0"/>
+                        <a:t>Avg. MAE</a:t>
+                      </a:r>
+                    </a:p>
+                  </a:txBody>
+                  <a:tcPr anchor="ctr"/>
+                </a:tc>
+                <a:tc>
+                  <a:txBody>
+                    <a:bodyPr/>
+                    <a:lstStyle/>
+                    <a:p>
+                      <a:pPr algn="ctr"/>
+                      <a:r>
+                        <a:rPr lang="en-US" sz="1600" dirty="0"/>
+                        <a:t>SD MAE</a:t>
+                      </a:r>
+                    </a:p>
+                  </a:txBody>
+                  <a:tcPr anchor="ctr"/>
+                </a:tc>
+                <a:tc>
+                  <a:txBody>
+                    <a:bodyPr/>
+                    <a:lstStyle/>
+                    <a:p>
+                      <a:pPr algn="ctr"/>
+                      <a:r>
+                        <a:rPr lang="en-US" sz="1600" dirty="0"/>
+                        <a:t>Avg. Diff.</a:t>
+                      </a:r>
+                    </a:p>
+                  </a:txBody>
+                  <a:tcPr anchor="ctr"/>
+                </a:tc>
+                <a:tc>
+                  <a:txBody>
+                    <a:bodyPr/>
+                    <a:lstStyle/>
+                    <a:p>
+                      <a:pPr algn="ctr"/>
+                      <a:r>
+                        <a:rPr lang="en-US" sz="1600" i="1" dirty="0"/>
+                        <a:t>t </a:t>
+                      </a:r>
+                      <a:r>
+                        <a:rPr lang="en-US" sz="1600" i="0" dirty="0"/>
+                        <a:t>statistic</a:t>
+                      </a:r>
+                      <a:endParaRPr lang="en-US" sz="1600" i="1" dirty="0"/>
+                    </a:p>
+                  </a:txBody>
+                  <a:tcPr anchor="ctr"/>
+                </a:tc>
+                <a:extLst>
+                  <a:ext uri="{0D108BD9-81ED-4DB2-BD59-A6C34878D82A}">
+                    <a16:rowId xmlns:a16="http://schemas.microsoft.com/office/drawing/2014/main" val="3442803741"/>
+                  </a:ext>
+                </a:extLst>
+              </a:tr>
+              <a:tr h="0">
+                <a:tc>
+                  <a:txBody>
+                    <a:bodyPr/>
+                    <a:lstStyle/>
+                    <a:p>
+                      <a:pPr algn="ctr"/>
+                      <a:r>
+                        <a:rPr lang="en-US" sz="1600" dirty="0"/>
+                        <a:t>Full</a:t>
+                      </a:r>
+                    </a:p>
+                  </a:txBody>
+                  <a:tcPr anchor="ctr"/>
+                </a:tc>
+                <a:tc>
+                  <a:txBody>
+                    <a:bodyPr/>
+                    <a:lstStyle/>
+                    <a:p>
+                      <a:pPr algn="ctr"/>
+                      <a:r>
+                        <a:rPr lang="en-US" sz="1600" dirty="0"/>
+                        <a:t>1146.34</a:t>
+                      </a:r>
+                    </a:p>
+                  </a:txBody>
+                  <a:tcPr anchor="ctr"/>
+                </a:tc>
+                <a:tc>
+                  <a:txBody>
+                    <a:bodyPr/>
+                    <a:lstStyle/>
+                    <a:p>
+                      <a:pPr algn="ctr"/>
+                      <a:r>
+                        <a:rPr lang="en-US" sz="1600" dirty="0"/>
+                        <a:t>9.46</a:t>
+                      </a:r>
+                    </a:p>
+                  </a:txBody>
+                  <a:tcPr anchor="ctr"/>
+                </a:tc>
+                <a:tc>
+                  <a:txBody>
+                    <a:bodyPr/>
+                    <a:lstStyle/>
+                    <a:p>
+                      <a:pPr algn="ctr"/>
+                      <a:r>
+                        <a:rPr lang="en-US" sz="1600" dirty="0"/>
+                        <a:t>2.35</a:t>
+                      </a:r>
+                    </a:p>
+                  </a:txBody>
+                  <a:tcPr anchor="ctr"/>
+                </a:tc>
+                <a:tc>
+                  <a:txBody>
+                    <a:bodyPr/>
+                    <a:lstStyle/>
+                    <a:p>
+                      <a:pPr algn="ctr"/>
+                      <a:r>
+                        <a:rPr lang="en-US" sz="1600" dirty="0"/>
+                        <a:t>2.06</a:t>
+                      </a:r>
+                    </a:p>
+                  </a:txBody>
+                  <a:tcPr anchor="ctr"/>
+                </a:tc>
+                <a:extLst>
+                  <a:ext uri="{0D108BD9-81ED-4DB2-BD59-A6C34878D82A}">
+                    <a16:rowId xmlns:a16="http://schemas.microsoft.com/office/drawing/2014/main" val="756519327"/>
+                  </a:ext>
+                </a:extLst>
+              </a:tr>
+              <a:tr h="0">
+                <a:tc>
+                  <a:txBody>
+                    <a:bodyPr/>
+                    <a:lstStyle/>
+                    <a:p>
+                      <a:pPr algn="ctr"/>
+                      <a:r>
+                        <a:rPr lang="en-US" sz="1600" dirty="0"/>
+                        <a:t>Reduced</a:t>
+                      </a:r>
+                    </a:p>
+                  </a:txBody>
+                  <a:tcPr anchor="ctr"/>
+                </a:tc>
+                <a:tc>
+                  <a:txBody>
+                    <a:bodyPr/>
+                    <a:lstStyle/>
+                    <a:p>
+                      <a:pPr algn="ctr"/>
+                      <a:r>
+                        <a:rPr lang="en-US" sz="1600" dirty="0"/>
+                        <a:t>1143.99</a:t>
+                      </a:r>
+                    </a:p>
+                  </a:txBody>
+                  <a:tcPr anchor="ctr"/>
+                </a:tc>
+                <a:tc>
+                  <a:txBody>
+                    <a:bodyPr/>
+                    <a:lstStyle/>
+                    <a:p>
+                      <a:pPr algn="ctr"/>
+                      <a:r>
+                        <a:rPr lang="en-US" sz="1600" dirty="0"/>
+                        <a:t>8.51</a:t>
+                      </a:r>
+                    </a:p>
+                  </a:txBody>
+                  <a:tcPr anchor="ctr"/>
+                </a:tc>
+                <a:tc>
+                  <a:txBody>
+                    <a:bodyPr/>
+                    <a:lstStyle/>
+                    <a:p>
+                      <a:pPr algn="ctr"/>
+                      <a:endParaRPr lang="en-US" sz="1600" dirty="0"/>
+                    </a:p>
+                  </a:txBody>
+                  <a:tcPr anchor="ctr"/>
+                </a:tc>
+                <a:tc>
+                  <a:txBody>
+                    <a:bodyPr/>
+                    <a:lstStyle/>
+                    <a:p>
+                      <a:pPr algn="ctr"/>
+                      <a:endParaRPr lang="en-US" sz="1600" dirty="0"/>
+                    </a:p>
+                  </a:txBody>
+                  <a:tcPr anchor="ctr"/>
+                </a:tc>
+                <a:extLst>
+                  <a:ext uri="{0D108BD9-81ED-4DB2-BD59-A6C34878D82A}">
+                    <a16:rowId xmlns:a16="http://schemas.microsoft.com/office/drawing/2014/main" val="3350978864"/>
+                  </a:ext>
+                </a:extLst>
+              </a:tr>
+            </a:tbl>
+          </a:graphicData>
+        </a:graphic>
+      </p:graphicFrame>
+      <mc:AlternateContent xmlns:mc="http://schemas.openxmlformats.org/markup-compatibility/2006">
+        <mc:Choice xmlns:a14="http://schemas.microsoft.com/office/drawing/2010/main" Requires="a14">
+          <p:sp>
+            <p:nvSpPr>
+              <p:cNvPr id="33" name="TextBox 32">
+                <a:extLst>
+                  <a:ext uri="{FF2B5EF4-FFF2-40B4-BE49-F238E27FC236}">
+                    <a16:creationId xmlns:a16="http://schemas.microsoft.com/office/drawing/2014/main" id="{C4D35232-CD28-E8B5-6774-F024459E50DA}"/>
+                  </a:ext>
+                </a:extLst>
+              </p:cNvPr>
+              <p:cNvSpPr txBox="1"/>
+              <p:nvPr/>
+            </p:nvSpPr>
+            <p:spPr>
+              <a:xfrm>
+                <a:off x="14915579" y="13991396"/>
+                <a:ext cx="5729088" cy="307777"/>
+              </a:xfrm>
+              <a:prstGeom prst="rect">
+                <a:avLst/>
+              </a:prstGeom>
+              <a:noFill/>
+            </p:spPr>
+            <p:txBody>
+              <a:bodyPr wrap="square" rtlCol="0">
+                <a:spAutoFit/>
+              </a:bodyPr>
+              <a:lstStyle/>
+              <a:p>
+                <a:r>
+                  <a:rPr lang="en-US" sz="1400" i="1" dirty="0"/>
+                  <a:t>p-</a:t>
+                </a:r>
+                <a:r>
+                  <a:rPr lang="en-US" sz="1400" dirty="0"/>
+                  <a:t>value = 0.0507, obtained with a </a:t>
+                </a:r>
+                <a14:m>
+                  <m:oMath xmlns:m="http://schemas.openxmlformats.org/officeDocument/2006/math">
+                    <m:sSub>
+                      <m:sSubPr>
+                        <m:ctrlPr>
+                          <a:rPr lang="en-US" sz="1400" i="1" smtClean="0">
+                            <a:latin typeface="Cambria Math" panose="02040503050406030204" pitchFamily="18" charset="0"/>
+                          </a:rPr>
+                        </m:ctrlPr>
+                      </m:sSubPr>
+                      <m:e>
+                        <m:r>
+                          <a:rPr lang="es-ES" sz="1400" b="0" i="1" smtClean="0">
+                            <a:latin typeface="Cambria Math" panose="02040503050406030204" pitchFamily="18" charset="0"/>
+                          </a:rPr>
+                          <m:t>𝑡</m:t>
+                        </m:r>
+                      </m:e>
+                      <m:sub>
+                        <m:r>
+                          <a:rPr lang="es-ES" sz="1400" b="0" i="1" smtClean="0">
+                            <a:latin typeface="Cambria Math" panose="02040503050406030204" pitchFamily="18" charset="0"/>
+                          </a:rPr>
+                          <m:t>𝑟</m:t>
+                        </m:r>
+                        <m:r>
+                          <a:rPr lang="es-ES" sz="1400" b="0" i="1" smtClean="0">
+                            <a:latin typeface="Cambria Math" panose="02040503050406030204" pitchFamily="18" charset="0"/>
+                            <a:ea typeface="Cambria Math" panose="02040503050406030204" pitchFamily="18" charset="0"/>
+                          </a:rPr>
+                          <m:t>×</m:t>
+                        </m:r>
+                        <m:r>
+                          <a:rPr lang="es-ES" sz="1400" b="0" i="1" smtClean="0">
+                            <a:latin typeface="Cambria Math" panose="02040503050406030204" pitchFamily="18" charset="0"/>
+                          </a:rPr>
+                          <m:t>𝑘</m:t>
+                        </m:r>
+                        <m:r>
+                          <a:rPr lang="es-ES" sz="1400" b="0" i="1" smtClean="0">
+                            <a:latin typeface="Cambria Math" panose="02040503050406030204" pitchFamily="18" charset="0"/>
+                          </a:rPr>
+                          <m:t>−1</m:t>
+                        </m:r>
+                      </m:sub>
+                    </m:sSub>
+                  </m:oMath>
+                </a14:m>
+                <a:r>
+                  <a:rPr lang="en-US" sz="1400" i="1" dirty="0"/>
+                  <a:t> </a:t>
+                </a:r>
+                <a:r>
+                  <a:rPr lang="en-US" sz="1400" dirty="0"/>
+                  <a:t>distribution.</a:t>
+                </a:r>
+                <a:endParaRPr lang="en-US" sz="1400" i="1" dirty="0"/>
+              </a:p>
+            </p:txBody>
+          </p:sp>
+        </mc:Choice>
+        <mc:Fallback>
+          <p:sp>
+            <p:nvSpPr>
+              <p:cNvPr id="33" name="TextBox 32">
+                <a:extLst>
+                  <a:ext uri="{FF2B5EF4-FFF2-40B4-BE49-F238E27FC236}">
+                    <a16:creationId xmlns:a16="http://schemas.microsoft.com/office/drawing/2014/main" id="{C4D35232-CD28-E8B5-6774-F024459E50DA}"/>
+                  </a:ext>
+                </a:extLst>
+              </p:cNvPr>
+              <p:cNvSpPr txBox="1">
+                <a:spLocks noRot="1" noChangeAspect="1" noMove="1" noResize="1" noEditPoints="1" noAdjustHandles="1" noChangeArrowheads="1" noChangeShapeType="1" noTextEdit="1"/>
+              </p:cNvSpPr>
+              <p:nvPr/>
+            </p:nvSpPr>
+            <p:spPr>
+              <a:xfrm>
+                <a:off x="14915579" y="13991396"/>
+                <a:ext cx="5729088" cy="307777"/>
+              </a:xfrm>
+              <a:prstGeom prst="rect">
+                <a:avLst/>
+              </a:prstGeom>
+              <a:blipFill>
+                <a:blip r:embed="rId10"/>
+                <a:stretch>
+                  <a:fillRect l="-221" t="-3846" b="-15385"/>
+                </a:stretch>
+              </a:blipFill>
+            </p:spPr>
+            <p:txBody>
+              <a:bodyPr/>
+              <a:lstStyle/>
+              <a:p>
+                <a:r>
+                  <a:rPr lang="en-US">
+                    <a:noFill/>
+                  </a:rPr>
+                  <a:t> </a:t>
+                </a:r>
+              </a:p>
+            </p:txBody>
+          </p:sp>
+        </mc:Fallback>
+      </mc:AlternateContent>
+      <p:sp>
+        <p:nvSpPr>
+          <p:cNvPr id="41" name="TextBox 40">
+            <a:extLst>
+              <a:ext uri="{FF2B5EF4-FFF2-40B4-BE49-F238E27FC236}">
+                <a16:creationId xmlns:a16="http://schemas.microsoft.com/office/drawing/2014/main" id="{794B5552-4C40-1464-ACA9-6300F6472273}"/>
+              </a:ext>
+            </a:extLst>
+          </p:cNvPr>
+          <p:cNvSpPr txBox="1"/>
+          <p:nvPr/>
+        </p:nvSpPr>
+        <p:spPr>
+          <a:xfrm>
+            <a:off x="14778942" y="12647002"/>
+            <a:ext cx="6638134" cy="338554"/>
+          </a:xfrm>
+          <a:prstGeom prst="rect">
+            <a:avLst/>
+          </a:prstGeom>
+          <a:noFill/>
+        </p:spPr>
+        <p:txBody>
+          <a:bodyPr wrap="square" rtlCol="0">
+            <a:spAutoFit/>
+          </a:bodyPr>
+          <a:lstStyle/>
+          <a:p>
+            <a:r>
+              <a:rPr lang="en-US" sz="1600" b="1" dirty="0"/>
+              <a:t>Does removing the two least important predictors affect performance?</a:t>
+            </a:r>
+          </a:p>
+        </p:txBody>
+      </p:sp>
+      <p:sp>
+        <p:nvSpPr>
+          <p:cNvPr id="47" name="TextBox 46">
+            <a:extLst>
+              <a:ext uri="{FF2B5EF4-FFF2-40B4-BE49-F238E27FC236}">
+                <a16:creationId xmlns:a16="http://schemas.microsoft.com/office/drawing/2014/main" id="{A5C4BCF6-DB27-90D1-2D37-299498A6149A}"/>
+              </a:ext>
+            </a:extLst>
+          </p:cNvPr>
+          <p:cNvSpPr txBox="1"/>
+          <p:nvPr/>
+        </p:nvSpPr>
+        <p:spPr>
+          <a:xfrm>
+            <a:off x="14899776" y="5480091"/>
+            <a:ext cx="6638134" cy="338554"/>
+          </a:xfrm>
+          <a:prstGeom prst="rect">
+            <a:avLst/>
+          </a:prstGeom>
+          <a:noFill/>
+        </p:spPr>
+        <p:txBody>
+          <a:bodyPr wrap="square" rtlCol="0">
+            <a:spAutoFit/>
+          </a:bodyPr>
+          <a:lstStyle/>
+          <a:p>
+            <a:r>
+              <a:rPr lang="en-US" sz="1600" b="1" dirty="0"/>
+              <a:t>Comparing two cross validation approaches.</a:t>
+            </a:r>
+          </a:p>
+        </p:txBody>
+      </p:sp>
+      <p:sp>
+        <p:nvSpPr>
+          <p:cNvPr id="49" name="Text Placeholder 11">
+            <a:extLst>
+              <a:ext uri="{FF2B5EF4-FFF2-40B4-BE49-F238E27FC236}">
+                <a16:creationId xmlns:a16="http://schemas.microsoft.com/office/drawing/2014/main" id="{B6EED827-9B5C-2279-2132-7F947B5F3B67}"/>
+              </a:ext>
+            </a:extLst>
+          </p:cNvPr>
+          <p:cNvSpPr txBox="1">
+            <a:spLocks/>
+          </p:cNvSpPr>
+          <p:nvPr/>
+        </p:nvSpPr>
+        <p:spPr>
+          <a:xfrm>
+            <a:off x="14726194" y="7167126"/>
+            <a:ext cx="6985298" cy="2031325"/>
+          </a:xfrm>
+          <a:prstGeom prst="rect">
+            <a:avLst/>
+          </a:prstGeom>
+        </p:spPr>
+        <p:txBody>
+          <a:bodyPr wrap="square" lIns="365760" tIns="365760" rIns="365760" bIns="365760">
+            <a:spAutoFit/>
+          </a:bodyPr>
+          <a:lstStyle>
+            <a:lvl1pPr marL="0" indent="0" algn="l" defTabSz="1820689" rtl="0" eaLnBrk="1" latinLnBrk="0" hangingPunct="1">
+              <a:spcBef>
+                <a:spcPct val="20000"/>
+              </a:spcBef>
+              <a:buFont typeface="Arial" pitchFamily="34" charset="0"/>
+              <a:buNone/>
+              <a:tabLst/>
+              <a:defRPr lang="en-US" sz="2000" kern="1200" dirty="0">
+                <a:solidFill>
+                  <a:schemeClr val="tx1"/>
+                </a:solidFill>
+                <a:latin typeface="+mn-lt"/>
+                <a:ea typeface="+mn-ea"/>
+                <a:cs typeface="+mn-cs"/>
+              </a:defRPr>
+            </a:lvl1pPr>
+            <a:lvl2pPr marL="492776" indent="-247234" algn="l" defTabSz="1820689" rtl="0" eaLnBrk="1" latinLnBrk="0" hangingPunct="1">
+              <a:spcBef>
+                <a:spcPct val="20000"/>
+              </a:spcBef>
+              <a:buFont typeface="Arial" pitchFamily="34" charset="0"/>
+              <a:buChar char="–"/>
+              <a:tabLst/>
+              <a:defRPr lang="en-US" sz="1600" kern="1200" dirty="0">
+                <a:solidFill>
+                  <a:schemeClr val="tx1"/>
+                </a:solidFill>
+                <a:latin typeface="+mn-lt"/>
+                <a:ea typeface="+mn-ea"/>
+                <a:cs typeface="+mn-cs"/>
+              </a:defRPr>
+            </a:lvl2pPr>
+            <a:lvl3pPr marL="492776" indent="-247234" algn="l" defTabSz="1820689" rtl="0" eaLnBrk="1" latinLnBrk="0" hangingPunct="1">
+              <a:spcBef>
+                <a:spcPct val="20000"/>
+              </a:spcBef>
+              <a:buFont typeface="Arial" pitchFamily="34" charset="0"/>
+              <a:buChar char="•"/>
+              <a:tabLst/>
+              <a:defRPr lang="en-US" sz="1200" kern="1200" dirty="0">
+                <a:solidFill>
+                  <a:schemeClr val="tx1"/>
+                </a:solidFill>
+                <a:latin typeface="+mn-lt"/>
+                <a:ea typeface="+mn-ea"/>
+                <a:cs typeface="+mn-cs"/>
+              </a:defRPr>
+            </a:lvl3pPr>
+            <a:lvl4pPr marL="492776" indent="-247234" algn="l" defTabSz="1820689" rtl="0" eaLnBrk="1" latinLnBrk="0" hangingPunct="1">
+              <a:spcBef>
+                <a:spcPct val="20000"/>
+              </a:spcBef>
+              <a:buFont typeface="Arial" pitchFamily="34" charset="0"/>
+              <a:buChar char="–"/>
+              <a:tabLst/>
+              <a:defRPr lang="en-US" sz="1000" kern="1200" dirty="0">
+                <a:solidFill>
+                  <a:schemeClr val="tx1"/>
+                </a:solidFill>
+                <a:latin typeface="+mn-lt"/>
+                <a:ea typeface="+mn-ea"/>
+                <a:cs typeface="+mn-cs"/>
+              </a:defRPr>
+            </a:lvl4pPr>
+            <a:lvl5pPr marL="492776" indent="-247234" algn="l" defTabSz="1820689" rtl="0" eaLnBrk="1" latinLnBrk="0" hangingPunct="1">
+              <a:spcBef>
+                <a:spcPct val="20000"/>
+              </a:spcBef>
+              <a:buFont typeface="Arial" pitchFamily="34" charset="0"/>
+              <a:buChar char="»"/>
+              <a:tabLst/>
+              <a:defRPr lang="en-US" sz="1000" kern="1200" dirty="0">
+                <a:solidFill>
+                  <a:schemeClr val="tx1"/>
+                </a:solidFill>
+                <a:latin typeface="+mn-lt"/>
+                <a:ea typeface="+mn-ea"/>
+                <a:cs typeface="+mn-cs"/>
+              </a:defRPr>
+            </a:lvl5pPr>
+            <a:lvl6pPr marL="5006898" indent="-455173" algn="l" defTabSz="1820689" rtl="0" eaLnBrk="1" latinLnBrk="0" hangingPunct="1">
+              <a:spcBef>
+                <a:spcPct val="20000"/>
+              </a:spcBef>
+              <a:buFont typeface="Arial" pitchFamily="34" charset="0"/>
+              <a:buChar char="•"/>
+              <a:defRPr sz="3983" kern="1200">
+                <a:solidFill>
+                  <a:schemeClr val="tx1"/>
+                </a:solidFill>
+                <a:latin typeface="+mn-lt"/>
+                <a:ea typeface="+mn-ea"/>
+                <a:cs typeface="+mn-cs"/>
+              </a:defRPr>
+            </a:lvl6pPr>
+            <a:lvl7pPr marL="5917242" indent="-455173" algn="l" defTabSz="1820689" rtl="0" eaLnBrk="1" latinLnBrk="0" hangingPunct="1">
+              <a:spcBef>
+                <a:spcPct val="20000"/>
+              </a:spcBef>
+              <a:buFont typeface="Arial" pitchFamily="34" charset="0"/>
+              <a:buChar char="•"/>
+              <a:defRPr sz="3983" kern="1200">
+                <a:solidFill>
+                  <a:schemeClr val="tx1"/>
+                </a:solidFill>
+                <a:latin typeface="+mn-lt"/>
+                <a:ea typeface="+mn-ea"/>
+                <a:cs typeface="+mn-cs"/>
+              </a:defRPr>
+            </a:lvl7pPr>
+            <a:lvl8pPr marL="6827587" indent="-455173" algn="l" defTabSz="1820689" rtl="0" eaLnBrk="1" latinLnBrk="0" hangingPunct="1">
+              <a:spcBef>
+                <a:spcPct val="20000"/>
+              </a:spcBef>
+              <a:buFont typeface="Arial" pitchFamily="34" charset="0"/>
+              <a:buChar char="•"/>
+              <a:defRPr sz="3983" kern="1200">
+                <a:solidFill>
+                  <a:schemeClr val="tx1"/>
+                </a:solidFill>
+                <a:latin typeface="+mn-lt"/>
+                <a:ea typeface="+mn-ea"/>
+                <a:cs typeface="+mn-cs"/>
+              </a:defRPr>
+            </a:lvl8pPr>
+            <a:lvl9pPr marL="7737932" indent="-455173" algn="l" defTabSz="1820689" rtl="0" eaLnBrk="1" latinLnBrk="0" hangingPunct="1">
+              <a:spcBef>
+                <a:spcPct val="20000"/>
+              </a:spcBef>
+              <a:buFont typeface="Arial" pitchFamily="34" charset="0"/>
+              <a:buChar char="•"/>
+              <a:defRPr sz="3983" kern="1200">
+                <a:solidFill>
+                  <a:schemeClr val="tx1"/>
+                </a:solidFill>
+                <a:latin typeface="+mn-lt"/>
+                <a:ea typeface="+mn-ea"/>
+                <a:cs typeface="+mn-cs"/>
+              </a:defRPr>
+            </a:lvl9pPr>
+          </a:lstStyle>
+          <a:p>
+            <a:pPr marL="342900" indent="-342900">
+              <a:buFont typeface="Arial" pitchFamily="34" charset="0"/>
+              <a:buChar char="•"/>
+            </a:pPr>
+            <a:r>
+              <a:rPr lang="en-US" dirty="0"/>
+              <a:t>Both methods yield similar results, the non-nested approach seems to be slightly optimistic.</a:t>
+            </a:r>
+          </a:p>
+          <a:p>
+            <a:pPr marL="342900" indent="-342900">
+              <a:buFont typeface="Arial" pitchFamily="34" charset="0"/>
+              <a:buChar char="•"/>
+            </a:pPr>
+            <a:r>
+              <a:rPr lang="en-US" dirty="0"/>
+              <a:t>The nested procedure requires considerably more computation time.</a:t>
+            </a:r>
+          </a:p>
+        </p:txBody>
+      </p:sp>
+      <p:sp>
+        <p:nvSpPr>
+          <p:cNvPr id="52" name="Text Placeholder 11">
+            <a:extLst>
+              <a:ext uri="{FF2B5EF4-FFF2-40B4-BE49-F238E27FC236}">
+                <a16:creationId xmlns:a16="http://schemas.microsoft.com/office/drawing/2014/main" id="{D21C9A84-7AC8-C34D-0147-ED7F0215F7CF}"/>
+              </a:ext>
+            </a:extLst>
+          </p:cNvPr>
+          <p:cNvSpPr txBox="1">
+            <a:spLocks/>
+          </p:cNvSpPr>
+          <p:nvPr/>
+        </p:nvSpPr>
+        <p:spPr>
+          <a:xfrm>
+            <a:off x="14773999" y="14286636"/>
+            <a:ext cx="6985298" cy="1723549"/>
+          </a:xfrm>
+          <a:prstGeom prst="rect">
+            <a:avLst/>
+          </a:prstGeom>
+        </p:spPr>
+        <p:txBody>
+          <a:bodyPr wrap="square" lIns="365760" tIns="365760" rIns="365760" bIns="365760">
+            <a:spAutoFit/>
+          </a:bodyPr>
+          <a:lstStyle>
+            <a:lvl1pPr marL="0" indent="0" algn="l" defTabSz="1820689" rtl="0" eaLnBrk="1" latinLnBrk="0" hangingPunct="1">
+              <a:spcBef>
+                <a:spcPct val="20000"/>
+              </a:spcBef>
+              <a:buFont typeface="Arial" pitchFamily="34" charset="0"/>
+              <a:buNone/>
+              <a:tabLst/>
+              <a:defRPr lang="en-US" sz="2000" kern="1200" dirty="0">
+                <a:solidFill>
+                  <a:schemeClr val="tx1"/>
+                </a:solidFill>
+                <a:latin typeface="+mn-lt"/>
+                <a:ea typeface="+mn-ea"/>
+                <a:cs typeface="+mn-cs"/>
+              </a:defRPr>
+            </a:lvl1pPr>
+            <a:lvl2pPr marL="492776" indent="-247234" algn="l" defTabSz="1820689" rtl="0" eaLnBrk="1" latinLnBrk="0" hangingPunct="1">
+              <a:spcBef>
+                <a:spcPct val="20000"/>
+              </a:spcBef>
+              <a:buFont typeface="Arial" pitchFamily="34" charset="0"/>
+              <a:buChar char="–"/>
+              <a:tabLst/>
+              <a:defRPr lang="en-US" sz="1600" kern="1200" dirty="0">
+                <a:solidFill>
+                  <a:schemeClr val="tx1"/>
+                </a:solidFill>
+                <a:latin typeface="+mn-lt"/>
+                <a:ea typeface="+mn-ea"/>
+                <a:cs typeface="+mn-cs"/>
+              </a:defRPr>
+            </a:lvl2pPr>
+            <a:lvl3pPr marL="492776" indent="-247234" algn="l" defTabSz="1820689" rtl="0" eaLnBrk="1" latinLnBrk="0" hangingPunct="1">
+              <a:spcBef>
+                <a:spcPct val="20000"/>
+              </a:spcBef>
+              <a:buFont typeface="Arial" pitchFamily="34" charset="0"/>
+              <a:buChar char="•"/>
+              <a:tabLst/>
+              <a:defRPr lang="en-US" sz="1200" kern="1200" dirty="0">
+                <a:solidFill>
+                  <a:schemeClr val="tx1"/>
+                </a:solidFill>
+                <a:latin typeface="+mn-lt"/>
+                <a:ea typeface="+mn-ea"/>
+                <a:cs typeface="+mn-cs"/>
+              </a:defRPr>
+            </a:lvl3pPr>
+            <a:lvl4pPr marL="492776" indent="-247234" algn="l" defTabSz="1820689" rtl="0" eaLnBrk="1" latinLnBrk="0" hangingPunct="1">
+              <a:spcBef>
+                <a:spcPct val="20000"/>
+              </a:spcBef>
+              <a:buFont typeface="Arial" pitchFamily="34" charset="0"/>
+              <a:buChar char="–"/>
+              <a:tabLst/>
+              <a:defRPr lang="en-US" sz="1000" kern="1200" dirty="0">
+                <a:solidFill>
+                  <a:schemeClr val="tx1"/>
+                </a:solidFill>
+                <a:latin typeface="+mn-lt"/>
+                <a:ea typeface="+mn-ea"/>
+                <a:cs typeface="+mn-cs"/>
+              </a:defRPr>
+            </a:lvl4pPr>
+            <a:lvl5pPr marL="492776" indent="-247234" algn="l" defTabSz="1820689" rtl="0" eaLnBrk="1" latinLnBrk="0" hangingPunct="1">
+              <a:spcBef>
+                <a:spcPct val="20000"/>
+              </a:spcBef>
+              <a:buFont typeface="Arial" pitchFamily="34" charset="0"/>
+              <a:buChar char="»"/>
+              <a:tabLst/>
+              <a:defRPr lang="en-US" sz="1000" kern="1200" dirty="0">
+                <a:solidFill>
+                  <a:schemeClr val="tx1"/>
+                </a:solidFill>
+                <a:latin typeface="+mn-lt"/>
+                <a:ea typeface="+mn-ea"/>
+                <a:cs typeface="+mn-cs"/>
+              </a:defRPr>
+            </a:lvl5pPr>
+            <a:lvl6pPr marL="5006898" indent="-455173" algn="l" defTabSz="1820689" rtl="0" eaLnBrk="1" latinLnBrk="0" hangingPunct="1">
+              <a:spcBef>
+                <a:spcPct val="20000"/>
+              </a:spcBef>
+              <a:buFont typeface="Arial" pitchFamily="34" charset="0"/>
+              <a:buChar char="•"/>
+              <a:defRPr sz="3983" kern="1200">
+                <a:solidFill>
+                  <a:schemeClr val="tx1"/>
+                </a:solidFill>
+                <a:latin typeface="+mn-lt"/>
+                <a:ea typeface="+mn-ea"/>
+                <a:cs typeface="+mn-cs"/>
+              </a:defRPr>
+            </a:lvl6pPr>
+            <a:lvl7pPr marL="5917242" indent="-455173" algn="l" defTabSz="1820689" rtl="0" eaLnBrk="1" latinLnBrk="0" hangingPunct="1">
+              <a:spcBef>
+                <a:spcPct val="20000"/>
+              </a:spcBef>
+              <a:buFont typeface="Arial" pitchFamily="34" charset="0"/>
+              <a:buChar char="•"/>
+              <a:defRPr sz="3983" kern="1200">
+                <a:solidFill>
+                  <a:schemeClr val="tx1"/>
+                </a:solidFill>
+                <a:latin typeface="+mn-lt"/>
+                <a:ea typeface="+mn-ea"/>
+                <a:cs typeface="+mn-cs"/>
+              </a:defRPr>
+            </a:lvl7pPr>
+            <a:lvl8pPr marL="6827587" indent="-455173" algn="l" defTabSz="1820689" rtl="0" eaLnBrk="1" latinLnBrk="0" hangingPunct="1">
+              <a:spcBef>
+                <a:spcPct val="20000"/>
+              </a:spcBef>
+              <a:buFont typeface="Arial" pitchFamily="34" charset="0"/>
+              <a:buChar char="•"/>
+              <a:defRPr sz="3983" kern="1200">
+                <a:solidFill>
+                  <a:schemeClr val="tx1"/>
+                </a:solidFill>
+                <a:latin typeface="+mn-lt"/>
+                <a:ea typeface="+mn-ea"/>
+                <a:cs typeface="+mn-cs"/>
+              </a:defRPr>
+            </a:lvl8pPr>
+            <a:lvl9pPr marL="7737932" indent="-455173" algn="l" defTabSz="1820689" rtl="0" eaLnBrk="1" latinLnBrk="0" hangingPunct="1">
+              <a:spcBef>
+                <a:spcPct val="20000"/>
+              </a:spcBef>
+              <a:buFont typeface="Arial" pitchFamily="34" charset="0"/>
+              <a:buChar char="•"/>
+              <a:defRPr sz="3983" kern="1200">
+                <a:solidFill>
+                  <a:schemeClr val="tx1"/>
+                </a:solidFill>
+                <a:latin typeface="+mn-lt"/>
+                <a:ea typeface="+mn-ea"/>
+                <a:cs typeface="+mn-cs"/>
+              </a:defRPr>
+            </a:lvl9pPr>
+          </a:lstStyle>
+          <a:p>
+            <a:pPr marL="342900" indent="-342900">
+              <a:buFont typeface="Arial" pitchFamily="34" charset="0"/>
+              <a:buChar char="•"/>
+            </a:pPr>
+            <a:r>
+              <a:rPr lang="en-US" dirty="0"/>
+              <a:t>The reduced model shows better predictive performance!</a:t>
+            </a:r>
+          </a:p>
+          <a:p>
+            <a:pPr marL="342900" indent="-342900">
+              <a:buFont typeface="Arial" pitchFamily="34" charset="0"/>
+              <a:buChar char="•"/>
+            </a:pPr>
+            <a:r>
+              <a:rPr lang="en-US" dirty="0"/>
+              <a:t>The difference in performance is not significant at a 5 % level.</a:t>
+            </a:r>
+          </a:p>
+        </p:txBody>
+      </p:sp>
     </p:spTree>
     <p:extLst>
       <p:ext uri="{BB962C8B-B14F-4D97-AF65-F5344CB8AC3E}">

</xml_diff>

<commit_message>
Finish writeup and poster
</commit_message>
<xml_diff>
--- a/docs/poster.pptx
+++ b/docs/poster.pptx
@@ -225,7 +225,7 @@
             <a:fld id="{0158C5BC-9A70-462C-B28D-9600239EAC64}" type="datetimeFigureOut">
               <a:rPr lang="en-US" smtClean="0"/>
               <a:pPr/>
-              <a:t>2/20/23</a:t>
+              <a:t>3/3/23</a:t>
             </a:fld>
             <a:endParaRPr lang="en-US"/>
           </a:p>
@@ -392,7 +392,7 @@
             <a:fld id="{E6CC2317-6751-4CD4-9995-8782DD78E936}" type="datetimeFigureOut">
               <a:rPr lang="en-US" smtClean="0"/>
               <a:pPr/>
-              <a:t>2/20/23</a:t>
+              <a:t>3/3/23</a:t>
             </a:fld>
             <a:endParaRPr lang="en-US" dirty="0"/>
           </a:p>
@@ -7855,8 +7855,8 @@
           </a:p>
         </p:txBody>
       </p:sp>
-      <mc:AlternateContent xmlns:mc="http://schemas.openxmlformats.org/markup-compatibility/2006" xmlns:a14="http://schemas.microsoft.com/office/drawing/2010/main">
-        <mc:Choice Requires="a14">
+      <mc:AlternateContent xmlns:mc="http://schemas.openxmlformats.org/markup-compatibility/2006">
+        <mc:Choice xmlns:a14="http://schemas.microsoft.com/office/drawing/2010/main" Requires="a14">
           <p:sp>
             <p:nvSpPr>
               <p:cNvPr id="10" name="Text Placeholder 9">
@@ -8028,7 +8028,15 @@
                 </a:pPr>
                 <a:r>
                   <a:rPr lang="en-US" dirty="0"/>
-                  <a:t>Hyperparameter optimization using all the validation sets yield over-optimistic performance estimations.</a:t>
+                  <a:t>Hyperparameter optimization using all the validation </a:t>
+                </a:r>
+                <a:r>
+                  <a:rPr lang="en-US"/>
+                  <a:t>sets yields </a:t>
+                </a:r>
+                <a:r>
+                  <a:rPr lang="en-US" dirty="0"/>
+                  <a:t>over-optimistic performance estimations.</a:t>
                 </a:r>
               </a:p>
               <a:p>
@@ -8453,7 +8461,7 @@
             </p:txBody>
           </p:sp>
         </mc:Choice>
-        <mc:Fallback xmlns="">
+        <mc:Fallback>
           <p:sp>
             <p:nvSpPr>
               <p:cNvPr id="10" name="Text Placeholder 9">

</xml_diff>